<commit_message>
Update Customer Churn Prediction presentation with revised content and visuals
</commit_message>
<xml_diff>
--- a/reports/Customer_Churn_Prediction.pptx
+++ b/reports/Customer_Churn_Prediction.pptx
@@ -5,10 +5,10 @@
     <p:sldMasterId id="2147483720" r:id="rId3"/>
   </p:sldMasterIdLst>
   <p:notesMasterIdLst>
-    <p:notesMasterId r:id="rId23"/>
+    <p:notesMasterId r:id="rId20"/>
   </p:notesMasterIdLst>
   <p:handoutMasterIdLst>
-    <p:handoutMasterId r:id="rId24"/>
+    <p:handoutMasterId r:id="rId21"/>
   </p:handoutMasterIdLst>
   <p:sldIdLst>
     <p:sldId id="1593" r:id="rId4"/>
@@ -20,16 +20,13 @@
     <p:sldId id="262" r:id="rId10"/>
     <p:sldId id="263" r:id="rId11"/>
     <p:sldId id="264" r:id="rId12"/>
-    <p:sldId id="265" r:id="rId13"/>
-    <p:sldId id="266" r:id="rId14"/>
-    <p:sldId id="267" r:id="rId15"/>
-    <p:sldId id="268" r:id="rId16"/>
-    <p:sldId id="269" r:id="rId17"/>
-    <p:sldId id="270" r:id="rId18"/>
-    <p:sldId id="271" r:id="rId19"/>
-    <p:sldId id="272" r:id="rId20"/>
-    <p:sldId id="273" r:id="rId21"/>
-    <p:sldId id="1594" r:id="rId22"/>
+    <p:sldId id="1595" r:id="rId13"/>
+    <p:sldId id="269" r:id="rId14"/>
+    <p:sldId id="270" r:id="rId15"/>
+    <p:sldId id="271" r:id="rId16"/>
+    <p:sldId id="272" r:id="rId17"/>
+    <p:sldId id="1596" r:id="rId18"/>
+    <p:sldId id="1594" r:id="rId19"/>
   </p:sldIdLst>
   <p:sldSz cx="12192000" cy="6858000"/>
   <p:notesSz cx="6858000" cy="9144000"/>
@@ -10306,8 +10303,8 @@
     <dgm:cxn modelId="{50CEF125-1A1A-4972-A49E-F313E27C3811}" type="presOf" srcId="{4B0167F3-8411-4B52-BB37-32E66CADF3E8}" destId="{ECEF8D6D-7090-4A6A-93F1-5446076C735A}" srcOrd="0" destOrd="0" presId="urn:microsoft.com/office/officeart/2018/2/layout/IconVerticalSolidList"/>
     <dgm:cxn modelId="{6F97312F-EED1-470F-A3F9-64C930407D71}" srcId="{4B0167F3-8411-4B52-BB37-32E66CADF3E8}" destId="{1C11242F-8984-4956-9CFB-77CB5099C3AB}" srcOrd="1" destOrd="0" parTransId="{8B9D5D2D-F4FD-497F-9A3C-CE466571E2CC}" sibTransId="{18168470-275A-47DA-8C6E-D01DA6268E4E}"/>
     <dgm:cxn modelId="{67E4BE37-2A91-44A5-88EA-D8BA4E0BADED}" type="presOf" srcId="{73DC826E-F9D1-41CD-98B8-B8A11CE9873E}" destId="{37BB1AD4-FB5B-4AF6-A8C7-C3945798A966}" srcOrd="0" destOrd="0" presId="urn:microsoft.com/office/officeart/2018/2/layout/IconVerticalSolidList"/>
+    <dgm:cxn modelId="{5113B569-A550-4143-A4CF-F43C3D64951C}" type="presOf" srcId="{1C11242F-8984-4956-9CFB-77CB5099C3AB}" destId="{6C83EE6E-3777-4CB7-B011-68DD8251BB17}" srcOrd="0" destOrd="0" presId="urn:microsoft.com/office/officeart/2018/2/layout/IconVerticalSolidList"/>
     <dgm:cxn modelId="{C851C556-6B10-4329-8FE4-323C2A4DC4AE}" type="presOf" srcId="{CFF275AE-2FA1-48B5-A752-D535235A4ACE}" destId="{3DF378B3-9A66-4573-81EB-B5E273865DD1}" srcOrd="0" destOrd="0" presId="urn:microsoft.com/office/officeart/2018/2/layout/IconVerticalSolidList"/>
-    <dgm:cxn modelId="{5113B569-A550-4143-A4CF-F43C3D64951C}" type="presOf" srcId="{1C11242F-8984-4956-9CFB-77CB5099C3AB}" destId="{6C83EE6E-3777-4CB7-B011-68DD8251BB17}" srcOrd="0" destOrd="0" presId="urn:microsoft.com/office/officeart/2018/2/layout/IconVerticalSolidList"/>
     <dgm:cxn modelId="{2FD08E7F-EE31-4880-812F-A3322A794B56}" srcId="{4B0167F3-8411-4B52-BB37-32E66CADF3E8}" destId="{CFF275AE-2FA1-48B5-A752-D535235A4ACE}" srcOrd="2" destOrd="0" parTransId="{13BB6EA0-62D0-45DE-A380-DC0C09352545}" sibTransId="{4561A223-D8C2-40E9-8E74-208E80BD452F}"/>
     <dgm:cxn modelId="{C7734CA1-B1CF-47A7-A310-FB97E9141A51}" srcId="{4B0167F3-8411-4B52-BB37-32E66CADF3E8}" destId="{73DC826E-F9D1-41CD-98B8-B8A11CE9873E}" srcOrd="0" destOrd="0" parTransId="{CA12FCBA-2EF1-48D1-8942-2EC4092AB5EB}" sibTransId="{81BA34F4-E9C5-4BA8-87F4-5B266B148AA9}"/>
     <dgm:cxn modelId="{06378ED6-17D7-48E2-A21D-098591DAFD03}" type="presParOf" srcId="{ECEF8D6D-7090-4A6A-93F1-5446076C735A}" destId="{CB50992F-49D3-42A3-8262-6E7535BAF770}" srcOrd="0" destOrd="0" presId="urn:microsoft.com/office/officeart/2018/2/layout/IconVerticalSolidList"/>
@@ -10342,7 +10339,7 @@
 <dgm:dataModel xmlns:dgm="http://schemas.openxmlformats.org/drawingml/2006/diagram" xmlns:a="http://schemas.openxmlformats.org/drawingml/2006/main">
   <dgm:ptLst>
     <dgm:pt modelId="{7AC3BB40-E0F2-4064-A990-6227B8D8E09C}" type="doc">
-      <dgm:prSet loTypeId="urn:microsoft.com/office/officeart/2008/layout/LinedList" loCatId="list" qsTypeId="urn:microsoft.com/office/officeart/2005/8/quickstyle/simple1" qsCatId="simple" csTypeId="urn:microsoft.com/office/officeart/2005/8/colors/colorful2" csCatId="colorful"/>
+      <dgm:prSet loTypeId="urn:microsoft.com/office/officeart/2008/layout/LinedList" loCatId="list" qsTypeId="urn:microsoft.com/office/officeart/2005/8/quickstyle/simple1" qsCatId="simple" csTypeId="urn:microsoft.com/office/officeart/2005/8/colors/colorful2" csCatId="colorful" phldr="1"/>
       <dgm:spPr/>
       <dgm:t>
         <a:bodyPr/>
@@ -10353,15 +10350,15 @@
       </dgm:t>
     </dgm:pt>
     <dgm:pt modelId="{42967402-C555-4DF5-9675-740DE9E2AAD2}">
-      <dgm:prSet/>
+      <dgm:prSet custT="1"/>
       <dgm:spPr/>
       <dgm:t>
         <a:bodyPr/>
         <a:lstStyle/>
         <a:p>
           <a:r>
-            <a:rPr lang="en-US"/>
-            <a:t>• Trees capture non‑linear patterns</a:t>
+            <a:rPr lang="en-US" sz="3200" dirty="0"/>
+            <a:t>• Decision Trees can capture non‑linear patterns but required tuning to achieve good performance.</a:t>
           </a:r>
         </a:p>
       </dgm:t>
@@ -10396,8 +10393,8 @@
         <a:lstStyle/>
         <a:p>
           <a:r>
-            <a:rPr lang="en-US"/>
-            <a:t>• Random Forest reduces overfitting</a:t>
+            <a:rPr lang="en-US" dirty="0"/>
+            <a:t>• Random Forest reduces overfitting, showed strong generalization and after tuning achieved one of the best-balanced performance.</a:t>
           </a:r>
         </a:p>
       </dgm:t>
@@ -10432,8 +10429,8 @@
         <a:lstStyle/>
         <a:p>
           <a:r>
-            <a:rPr lang="en-US"/>
-            <a:t>• SVM precise but lower recall</a:t>
+            <a:rPr lang="en-US" dirty="0"/>
+            <a:t>• SVM provided good precision but lower recall compared to top performing models which means it was more conservative in identifying churners.</a:t>
           </a:r>
         </a:p>
       </dgm:t>
@@ -11232,8 +11229,8 @@
             </a:lnSpc>
           </a:pPr>
           <a:r>
-            <a:rPr lang="en-US"/>
-            <a:t>• Random Forest is best overall</a:t>
+            <a:rPr lang="en-US" dirty="0"/>
+            <a:t>• Practical for real retention systems</a:t>
           </a:r>
         </a:p>
       </dgm:t>
@@ -11273,8 +11270,8 @@
             </a:lnSpc>
           </a:pPr>
           <a:r>
-            <a:rPr lang="en-US"/>
-            <a:t>• Practical for real retention systems</a:t>
+            <a:rPr lang="en-US" dirty="0"/>
+            <a:t>• Logistic Regression is the best overall providing the strongest &amp; most generalization performance, high AUC, and a well-balanced precision-recall tradeoff both before and after hyperparameter tuning.</a:t>
           </a:r>
         </a:p>
       </dgm:t>
@@ -11321,7 +11318,7 @@
     <dgm:pt modelId="{15B8A6C6-900C-4E0E-B9A5-E338F2A882B5}" type="pres">
       <dgm:prSet presAssocID="{D2F729D9-AE03-444C-B87E-C6B5D9D90B80}" presName="iconRect" presStyleLbl="node1" presStyleIdx="0" presStyleCnt="3"/>
       <dgm:spPr>
-        <a:blipFill>
+        <a:blipFill rotWithShape="1">
           <a:blip xmlns:r="http://schemas.openxmlformats.org/officeDocument/2006/relationships" r:embed="rId1">
             <a:extLst>
               <a:ext uri="{28A0092B-C50C-407E-A947-70E740481C1C}">
@@ -11332,6 +11329,7 @@
               </a:ext>
             </a:extLst>
           </a:blip>
+          <a:srcRect/>
           <a:stretch>
             <a:fillRect/>
           </a:stretch>
@@ -11371,17 +11369,9 @@
     <dgm:pt modelId="{4CE16220-DF10-48E8-8988-255957226592}" type="pres">
       <dgm:prSet presAssocID="{19DA8D7F-FE06-4EE2-B936-D140732F7107}" presName="iconRect" presStyleLbl="node1" presStyleIdx="1" presStyleCnt="3"/>
       <dgm:spPr>
-        <a:blipFill>
-          <a:blip xmlns:r="http://schemas.openxmlformats.org/officeDocument/2006/relationships" r:embed="rId3">
-            <a:extLst>
-              <a:ext uri="{28A0092B-C50C-407E-A947-70E740481C1C}">
-                <a14:useLocalDpi xmlns:a14="http://schemas.microsoft.com/office/drawing/2010/main" val="0"/>
-              </a:ext>
-              <a:ext uri="{96DAC541-7B7A-43D3-8B79-37D633B846F1}">
-                <asvg:svgBlip xmlns:asvg="http://schemas.microsoft.com/office/drawing/2016/SVG/main" r:embed="rId4"/>
-              </a:ext>
-            </a:extLst>
-          </a:blip>
+        <a:blipFill rotWithShape="1">
+          <a:blip xmlns:r="http://schemas.openxmlformats.org/officeDocument/2006/relationships" r:embed="rId3"/>
+          <a:srcRect/>
           <a:stretch>
             <a:fillRect/>
           </a:stretch>
@@ -11421,17 +11411,9 @@
     <dgm:pt modelId="{F286D9AE-D18A-4A7F-8421-3F932D6EA2E2}" type="pres">
       <dgm:prSet presAssocID="{1DE3B479-554B-4876-AAE2-0FCC57E6C533}" presName="iconRect" presStyleLbl="node1" presStyleIdx="2" presStyleCnt="3"/>
       <dgm:spPr>
-        <a:blipFill>
-          <a:blip xmlns:r="http://schemas.openxmlformats.org/officeDocument/2006/relationships" r:embed="rId5">
-            <a:extLst>
-              <a:ext uri="{28A0092B-C50C-407E-A947-70E740481C1C}">
-                <a14:useLocalDpi xmlns:a14="http://schemas.microsoft.com/office/drawing/2010/main" val="0"/>
-              </a:ext>
-              <a:ext uri="{96DAC541-7B7A-43D3-8B79-37D633B846F1}">
-                <asvg:svgBlip xmlns:asvg="http://schemas.microsoft.com/office/drawing/2016/SVG/main" r:embed="rId6"/>
-              </a:ext>
-            </a:extLst>
-          </a:blip>
+        <a:blipFill rotWithShape="1">
+          <a:blip xmlns:r="http://schemas.openxmlformats.org/officeDocument/2006/relationships" r:embed="rId4"/>
+          <a:srcRect/>
           <a:stretch>
             <a:fillRect/>
           </a:stretch>
@@ -11497,7 +11479,7 @@
 <dgm:dataModel xmlns:dgm="http://schemas.openxmlformats.org/drawingml/2006/diagram" xmlns:a="http://schemas.openxmlformats.org/drawingml/2006/main">
   <dgm:ptLst>
     <dgm:pt modelId="{B84C5BE4-2A53-4215-9F39-1CD907EFF2FE}" type="doc">
-      <dgm:prSet loTypeId="urn:microsoft.com/office/officeart/2016/7/layout/VerticalDownArrowProcess" loCatId="process" qsTypeId="urn:microsoft.com/office/officeart/2005/8/quickstyle/simple1" qsCatId="simple" csTypeId="urn:microsoft.com/office/officeart/2005/8/colors/colorful2" csCatId="colorful"/>
+      <dgm:prSet loTypeId="urn:microsoft.com/office/officeart/2016/7/layout/VerticalDownArrowProcess" loCatId="process" qsTypeId="urn:microsoft.com/office/officeart/2005/8/quickstyle/simple1" qsCatId="simple" csTypeId="urn:microsoft.com/office/officeart/2005/8/colors/colorful2" csCatId="colorful" phldr="1"/>
       <dgm:spPr/>
       <dgm:t>
         <a:bodyPr/>
@@ -11508,16 +11490,17 @@
       </dgm:t>
     </dgm:pt>
     <dgm:pt modelId="{C2A21BE3-98AE-41D7-A399-B9D5FED9E62B}">
-      <dgm:prSet/>
+      <dgm:prSet custT="1"/>
       <dgm:spPr/>
       <dgm:t>
         <a:bodyPr/>
         <a:lstStyle/>
         <a:p>
           <a:r>
-            <a:rPr lang="en-US"/>
+            <a:rPr lang="en-US" sz="2800" dirty="0"/>
             <a:t>Build</a:t>
           </a:r>
+          <a:endParaRPr lang="en-US" sz="1600" dirty="0"/>
         </a:p>
       </dgm:t>
     </dgm:pt>
@@ -11544,14 +11527,14 @@
       </dgm:t>
     </dgm:pt>
     <dgm:pt modelId="{65C3C378-CF6F-4042-A28B-40329047280A}">
-      <dgm:prSet/>
+      <dgm:prSet custT="1"/>
       <dgm:spPr/>
       <dgm:t>
         <a:bodyPr/>
         <a:lstStyle/>
         <a:p>
           <a:r>
-            <a:rPr lang="en-US"/>
+            <a:rPr lang="en-US" sz="2400" dirty="0"/>
             <a:t>Build reproducible ML pipeline</a:t>
           </a:r>
         </a:p>
@@ -11580,14 +11563,14 @@
       </dgm:t>
     </dgm:pt>
     <dgm:pt modelId="{500D57A4-3805-4D88-8157-502910E68F89}">
-      <dgm:prSet/>
+      <dgm:prSet custT="1"/>
       <dgm:spPr/>
       <dgm:t>
         <a:bodyPr/>
         <a:lstStyle/>
         <a:p>
           <a:r>
-            <a:rPr lang="en-US"/>
+            <a:rPr lang="en-US" sz="2800" dirty="0"/>
             <a:t>Compare</a:t>
           </a:r>
         </a:p>
@@ -11616,14 +11599,14 @@
       </dgm:t>
     </dgm:pt>
     <dgm:pt modelId="{4E3CFE51-CC92-4B19-9945-B91CE7C106F3}">
-      <dgm:prSet/>
+      <dgm:prSet custT="1"/>
       <dgm:spPr/>
       <dgm:t>
         <a:bodyPr/>
         <a:lstStyle/>
         <a:p>
           <a:r>
-            <a:rPr lang="en-US"/>
+            <a:rPr lang="en-US" sz="2400" dirty="0"/>
             <a:t>Compare multiple models</a:t>
           </a:r>
         </a:p>
@@ -11652,14 +11635,14 @@
       </dgm:t>
     </dgm:pt>
     <dgm:pt modelId="{F3D63710-AB9D-4152-862E-3E6E1A3AFA35}">
-      <dgm:prSet/>
+      <dgm:prSet custT="1"/>
       <dgm:spPr/>
       <dgm:t>
         <a:bodyPr/>
         <a:lstStyle/>
         <a:p>
           <a:r>
-            <a:rPr lang="en-US"/>
+            <a:rPr lang="en-US" sz="2800" dirty="0"/>
             <a:t>Identify</a:t>
           </a:r>
         </a:p>
@@ -11688,14 +11671,14 @@
       </dgm:t>
     </dgm:pt>
     <dgm:pt modelId="{63E1850E-9A76-49A6-B3CB-2465D0E361AA}">
-      <dgm:prSet/>
+      <dgm:prSet custT="1"/>
       <dgm:spPr/>
       <dgm:t>
         <a:bodyPr/>
         <a:lstStyle/>
         <a:p>
           <a:r>
-            <a:rPr lang="en-US"/>
+            <a:rPr lang="en-US" sz="2400" dirty="0"/>
             <a:t>Identify key churn drivers</a:t>
           </a:r>
         </a:p>
@@ -11724,14 +11707,14 @@
       </dgm:t>
     </dgm:pt>
     <dgm:pt modelId="{4023C842-45FA-49AD-8CAA-75BCEEF7869E}">
-      <dgm:prSet/>
+      <dgm:prSet custT="1"/>
       <dgm:spPr/>
       <dgm:t>
         <a:bodyPr/>
         <a:lstStyle/>
         <a:p>
           <a:r>
-            <a:rPr lang="en-US"/>
+            <a:rPr lang="en-US" sz="2800" dirty="0"/>
             <a:t>Evaluate</a:t>
           </a:r>
         </a:p>
@@ -11760,14 +11743,14 @@
       </dgm:t>
     </dgm:pt>
     <dgm:pt modelId="{7710CD6A-1A0B-44BE-9E6F-A4C073C6107B}">
-      <dgm:prSet/>
+      <dgm:prSet custT="1"/>
       <dgm:spPr/>
       <dgm:t>
         <a:bodyPr/>
         <a:lstStyle/>
         <a:p>
           <a:r>
-            <a:rPr lang="en-US"/>
+            <a:rPr lang="en-US" sz="2400" dirty="0"/>
             <a:t>Evaluate using ROC, F1, confusion matrices</a:t>
           </a:r>
         </a:p>
@@ -11795,6 +11778,152 @@
         </a:p>
       </dgm:t>
     </dgm:pt>
+    <dgm:pt modelId="{542C14DC-AF38-4119-BA12-66E9F40F7A88}">
+      <dgm:prSet custT="1"/>
+      <dgm:spPr/>
+      <dgm:t>
+        <a:bodyPr/>
+        <a:lstStyle/>
+        <a:p>
+          <a:r>
+            <a:rPr lang="en-US" sz="2000" dirty="0"/>
+            <a:t>Model Tuning</a:t>
+          </a:r>
+        </a:p>
+      </dgm:t>
+    </dgm:pt>
+    <dgm:pt modelId="{B6B69D4D-37D7-45DC-B131-E69E1115A498}" type="parTrans" cxnId="{5DE172F0-15FD-4C80-885A-1536CBA5B3B8}">
+      <dgm:prSet/>
+      <dgm:spPr/>
+      <dgm:t>
+        <a:bodyPr/>
+        <a:lstStyle/>
+        <a:p>
+          <a:endParaRPr lang="en-IN"/>
+        </a:p>
+      </dgm:t>
+    </dgm:pt>
+    <dgm:pt modelId="{54F262F2-63B4-43A6-BF81-6B10BF78D802}" type="sibTrans" cxnId="{5DE172F0-15FD-4C80-885A-1536CBA5B3B8}">
+      <dgm:prSet/>
+      <dgm:spPr/>
+      <dgm:t>
+        <a:bodyPr/>
+        <a:lstStyle/>
+        <a:p>
+          <a:endParaRPr lang="en-IN"/>
+        </a:p>
+      </dgm:t>
+    </dgm:pt>
+    <dgm:pt modelId="{88F1B4A4-2DAF-43BA-BE5A-7F7B6A58BE70}">
+      <dgm:prSet custT="1"/>
+      <dgm:spPr/>
+      <dgm:t>
+        <a:bodyPr/>
+        <a:lstStyle/>
+        <a:p>
+          <a:r>
+            <a:rPr lang="en-US" sz="2000" dirty="0"/>
+            <a:t>Perform Hyperparameter Tuning and Re-evaluate the models</a:t>
+          </a:r>
+        </a:p>
+      </dgm:t>
+    </dgm:pt>
+    <dgm:pt modelId="{7AA3FBA2-29CD-409A-A55C-68CBDE5DBBF9}" type="parTrans" cxnId="{6C8789C1-6F02-4DD5-BCC1-16AD98637B1F}">
+      <dgm:prSet/>
+      <dgm:spPr/>
+      <dgm:t>
+        <a:bodyPr/>
+        <a:lstStyle/>
+        <a:p>
+          <a:endParaRPr lang="en-IN"/>
+        </a:p>
+      </dgm:t>
+    </dgm:pt>
+    <dgm:pt modelId="{0197D9BB-9AC8-490A-8EB5-AC1D54D8AA52}" type="sibTrans" cxnId="{6C8789C1-6F02-4DD5-BCC1-16AD98637B1F}">
+      <dgm:prSet/>
+      <dgm:spPr/>
+      <dgm:t>
+        <a:bodyPr/>
+        <a:lstStyle/>
+        <a:p>
+          <a:endParaRPr lang="en-IN"/>
+        </a:p>
+      </dgm:t>
+    </dgm:pt>
+    <dgm:pt modelId="{A37E84B3-C289-4FAC-9F93-7653C447AE33}">
+      <dgm:prSet custT="1"/>
+      <dgm:spPr/>
+      <dgm:t>
+        <a:bodyPr/>
+        <a:lstStyle/>
+        <a:p>
+          <a:r>
+            <a:rPr lang="en-US" sz="2000"/>
+            <a:t>Result Comparison</a:t>
+          </a:r>
+          <a:endParaRPr lang="en-US" sz="2000" dirty="0"/>
+        </a:p>
+      </dgm:t>
+    </dgm:pt>
+    <dgm:pt modelId="{8769CD14-C9BF-4B8A-BC1E-9FE89EC515F8}" type="parTrans" cxnId="{C75EBCF0-A8CE-403E-92C8-76AFE7B358F6}">
+      <dgm:prSet/>
+      <dgm:spPr/>
+      <dgm:t>
+        <a:bodyPr/>
+        <a:lstStyle/>
+        <a:p>
+          <a:endParaRPr lang="en-IN"/>
+        </a:p>
+      </dgm:t>
+    </dgm:pt>
+    <dgm:pt modelId="{D8F41B40-3BCA-4F34-B653-0FCBD1B7A387}" type="sibTrans" cxnId="{C75EBCF0-A8CE-403E-92C8-76AFE7B358F6}">
+      <dgm:prSet/>
+      <dgm:spPr/>
+      <dgm:t>
+        <a:bodyPr/>
+        <a:lstStyle/>
+        <a:p>
+          <a:endParaRPr lang="en-IN"/>
+        </a:p>
+      </dgm:t>
+    </dgm:pt>
+    <dgm:pt modelId="{FF942839-4A2E-426A-A696-EB22EC29DCA6}">
+      <dgm:prSet custT="1"/>
+      <dgm:spPr/>
+      <dgm:t>
+        <a:bodyPr/>
+        <a:lstStyle/>
+        <a:p>
+          <a:r>
+            <a:rPr lang="en-US" sz="2000"/>
+            <a:t>Compare the results obtained before and after tuning</a:t>
+          </a:r>
+          <a:endParaRPr lang="en-US" sz="2000" dirty="0"/>
+        </a:p>
+      </dgm:t>
+    </dgm:pt>
+    <dgm:pt modelId="{9519ABE1-ABDD-4D98-8DD5-45CABE2C0E2B}" type="parTrans" cxnId="{B1E995C2-B19E-4F1A-A019-284A9B8AE8A4}">
+      <dgm:prSet/>
+      <dgm:spPr/>
+      <dgm:t>
+        <a:bodyPr/>
+        <a:lstStyle/>
+        <a:p>
+          <a:endParaRPr lang="en-IN"/>
+        </a:p>
+      </dgm:t>
+    </dgm:pt>
+    <dgm:pt modelId="{C2B5D8AF-D86D-4B1B-BF91-00F5B4B7E743}" type="sibTrans" cxnId="{B1E995C2-B19E-4F1A-A019-284A9B8AE8A4}">
+      <dgm:prSet/>
+      <dgm:spPr/>
+      <dgm:t>
+        <a:bodyPr/>
+        <a:lstStyle/>
+        <a:p>
+          <a:endParaRPr lang="en-IN"/>
+        </a:p>
+      </dgm:t>
+    </dgm:pt>
     <dgm:pt modelId="{ACD11CC8-3600-994F-BDFB-C3AC67C3AAFA}" type="pres">
       <dgm:prSet presAssocID="{B84C5BE4-2A53-4215-9F39-1CD907EFF2FE}" presName="Name0" presStyleCnt="0">
         <dgm:presLayoutVars>
@@ -11805,16 +11934,56 @@
       </dgm:prSet>
       <dgm:spPr/>
     </dgm:pt>
-    <dgm:pt modelId="{0D3AAEE1-D32A-DD40-8125-A74A99224CE3}" type="pres">
-      <dgm:prSet presAssocID="{4023C842-45FA-49AD-8CAA-75BCEEF7869E}" presName="boxAndChildren" presStyleCnt="0"/>
+    <dgm:pt modelId="{2224D17D-E179-4141-AE13-F15D51804184}" type="pres">
+      <dgm:prSet presAssocID="{A37E84B3-C289-4FAC-9F93-7653C447AE33}" presName="boxAndChildren" presStyleCnt="0"/>
       <dgm:spPr/>
     </dgm:pt>
-    <dgm:pt modelId="{2179E7BB-5544-AA45-89A4-77EE9A2D4A38}" type="pres">
-      <dgm:prSet presAssocID="{4023C842-45FA-49AD-8CAA-75BCEEF7869E}" presName="parentTextBox" presStyleLbl="alignNode1" presStyleIdx="0" presStyleCnt="4"/>
+    <dgm:pt modelId="{08DA8AE2-FD40-4AFF-B0B6-DFBDF8B91469}" type="pres">
+      <dgm:prSet presAssocID="{A37E84B3-C289-4FAC-9F93-7653C447AE33}" presName="parentTextBox" presStyleLbl="alignNode1" presStyleIdx="0" presStyleCnt="6"/>
       <dgm:spPr/>
     </dgm:pt>
-    <dgm:pt modelId="{ED4C37FD-E652-5347-B245-F9D2404C50FB}" type="pres">
-      <dgm:prSet presAssocID="{4023C842-45FA-49AD-8CAA-75BCEEF7869E}" presName="descendantBox" presStyleLbl="bgAccFollowNode1" presStyleIdx="0" presStyleCnt="4"/>
+    <dgm:pt modelId="{192BFB00-CDC3-49D8-A0F1-006005A2CA20}" type="pres">
+      <dgm:prSet presAssocID="{A37E84B3-C289-4FAC-9F93-7653C447AE33}" presName="descendantBox" presStyleLbl="bgAccFollowNode1" presStyleIdx="0" presStyleCnt="6"/>
+      <dgm:spPr/>
+    </dgm:pt>
+    <dgm:pt modelId="{31B35502-C7FD-49EC-98CA-010625D12865}" type="pres">
+      <dgm:prSet presAssocID="{54F262F2-63B4-43A6-BF81-6B10BF78D802}" presName="sp" presStyleCnt="0"/>
+      <dgm:spPr/>
+    </dgm:pt>
+    <dgm:pt modelId="{296B988D-D2B0-43B5-85DE-E375E039E384}" type="pres">
+      <dgm:prSet presAssocID="{542C14DC-AF38-4119-BA12-66E9F40F7A88}" presName="arrowAndChildren" presStyleCnt="0"/>
+      <dgm:spPr/>
+    </dgm:pt>
+    <dgm:pt modelId="{83D2161C-C98E-4C68-8625-CB13007F97FC}" type="pres">
+      <dgm:prSet presAssocID="{542C14DC-AF38-4119-BA12-66E9F40F7A88}" presName="parentTextArrow" presStyleLbl="node1" presStyleIdx="0" presStyleCnt="0"/>
+      <dgm:spPr/>
+    </dgm:pt>
+    <dgm:pt modelId="{478A46B8-D9DF-4AA6-8F34-92BA0C18D709}" type="pres">
+      <dgm:prSet presAssocID="{542C14DC-AF38-4119-BA12-66E9F40F7A88}" presName="arrow" presStyleLbl="alignNode1" presStyleIdx="1" presStyleCnt="6"/>
+      <dgm:spPr/>
+    </dgm:pt>
+    <dgm:pt modelId="{A64E94A7-3257-4A22-BF68-E6378EB15A1C}" type="pres">
+      <dgm:prSet presAssocID="{542C14DC-AF38-4119-BA12-66E9F40F7A88}" presName="descendantArrow" presStyleLbl="bgAccFollowNode1" presStyleIdx="1" presStyleCnt="6"/>
+      <dgm:spPr/>
+    </dgm:pt>
+    <dgm:pt modelId="{AAD1A3C0-32B6-42DD-B8BD-62DA11A60FB8}" type="pres">
+      <dgm:prSet presAssocID="{3C7AA123-81E2-495A-A374-7CB359AEA844}" presName="sp" presStyleCnt="0"/>
+      <dgm:spPr/>
+    </dgm:pt>
+    <dgm:pt modelId="{E02B59A0-DB52-4425-8D58-3E4D3D2F1363}" type="pres">
+      <dgm:prSet presAssocID="{4023C842-45FA-49AD-8CAA-75BCEEF7869E}" presName="arrowAndChildren" presStyleCnt="0"/>
+      <dgm:spPr/>
+    </dgm:pt>
+    <dgm:pt modelId="{F369EE7D-A924-4099-AEF0-4A12C2A2D6F7}" type="pres">
+      <dgm:prSet presAssocID="{4023C842-45FA-49AD-8CAA-75BCEEF7869E}" presName="parentTextArrow" presStyleLbl="node1" presStyleIdx="0" presStyleCnt="0"/>
+      <dgm:spPr/>
+    </dgm:pt>
+    <dgm:pt modelId="{71D90824-5929-4253-9DD4-B45EFFB3F875}" type="pres">
+      <dgm:prSet presAssocID="{4023C842-45FA-49AD-8CAA-75BCEEF7869E}" presName="arrow" presStyleLbl="alignNode1" presStyleIdx="2" presStyleCnt="6"/>
+      <dgm:spPr/>
+    </dgm:pt>
+    <dgm:pt modelId="{CF1C78FE-D127-4DDE-9FE4-78FF94448E8F}" type="pres">
+      <dgm:prSet presAssocID="{4023C842-45FA-49AD-8CAA-75BCEEF7869E}" presName="descendantArrow" presStyleLbl="bgAccFollowNode1" presStyleIdx="2" presStyleCnt="6"/>
       <dgm:spPr/>
     </dgm:pt>
     <dgm:pt modelId="{448A6327-F029-8A4E-AC64-9ECCA261F385}" type="pres">
@@ -11830,11 +11999,11 @@
       <dgm:spPr/>
     </dgm:pt>
     <dgm:pt modelId="{6F1816EA-C042-AC46-B05B-47202C60DE32}" type="pres">
-      <dgm:prSet presAssocID="{F3D63710-AB9D-4152-862E-3E6E1A3AFA35}" presName="arrow" presStyleLbl="alignNode1" presStyleIdx="1" presStyleCnt="4"/>
+      <dgm:prSet presAssocID="{F3D63710-AB9D-4152-862E-3E6E1A3AFA35}" presName="arrow" presStyleLbl="alignNode1" presStyleIdx="3" presStyleCnt="6"/>
       <dgm:spPr/>
     </dgm:pt>
     <dgm:pt modelId="{16ADB738-2B7D-BB49-B253-8C697AC25402}" type="pres">
-      <dgm:prSet presAssocID="{F3D63710-AB9D-4152-862E-3E6E1A3AFA35}" presName="descendantArrow" presStyleLbl="bgAccFollowNode1" presStyleIdx="1" presStyleCnt="4"/>
+      <dgm:prSet presAssocID="{F3D63710-AB9D-4152-862E-3E6E1A3AFA35}" presName="descendantArrow" presStyleLbl="bgAccFollowNode1" presStyleIdx="3" presStyleCnt="6"/>
       <dgm:spPr/>
     </dgm:pt>
     <dgm:pt modelId="{03B146D7-6B63-FC48-B714-F992432CFE82}" type="pres">
@@ -11850,11 +12019,11 @@
       <dgm:spPr/>
     </dgm:pt>
     <dgm:pt modelId="{2C98E024-EA30-4940-86BB-1786E33B3386}" type="pres">
-      <dgm:prSet presAssocID="{500D57A4-3805-4D88-8157-502910E68F89}" presName="arrow" presStyleLbl="alignNode1" presStyleIdx="2" presStyleCnt="4"/>
+      <dgm:prSet presAssocID="{500D57A4-3805-4D88-8157-502910E68F89}" presName="arrow" presStyleLbl="alignNode1" presStyleIdx="4" presStyleCnt="6"/>
       <dgm:spPr/>
     </dgm:pt>
     <dgm:pt modelId="{8B9DBE26-56BB-834B-94FE-F4C0F223A6A9}" type="pres">
-      <dgm:prSet presAssocID="{500D57A4-3805-4D88-8157-502910E68F89}" presName="descendantArrow" presStyleLbl="bgAccFollowNode1" presStyleIdx="2" presStyleCnt="4"/>
+      <dgm:prSet presAssocID="{500D57A4-3805-4D88-8157-502910E68F89}" presName="descendantArrow" presStyleLbl="bgAccFollowNode1" presStyleIdx="4" presStyleCnt="6"/>
       <dgm:spPr/>
     </dgm:pt>
     <dgm:pt modelId="{6A7191F0-227B-6F46-A2A0-ECAEBC96D520}" type="pres">
@@ -11870,53 +12039,73 @@
       <dgm:spPr/>
     </dgm:pt>
     <dgm:pt modelId="{29D6F870-D01B-3844-9017-D580A8ED4A41}" type="pres">
-      <dgm:prSet presAssocID="{C2A21BE3-98AE-41D7-A399-B9D5FED9E62B}" presName="arrow" presStyleLbl="alignNode1" presStyleIdx="3" presStyleCnt="4"/>
+      <dgm:prSet presAssocID="{C2A21BE3-98AE-41D7-A399-B9D5FED9E62B}" presName="arrow" presStyleLbl="alignNode1" presStyleIdx="5" presStyleCnt="6"/>
       <dgm:spPr/>
     </dgm:pt>
     <dgm:pt modelId="{9C631705-1328-6B4E-8D56-E2DC8365389F}" type="pres">
-      <dgm:prSet presAssocID="{C2A21BE3-98AE-41D7-A399-B9D5FED9E62B}" presName="descendantArrow" presStyleLbl="bgAccFollowNode1" presStyleIdx="3" presStyleCnt="4"/>
+      <dgm:prSet presAssocID="{C2A21BE3-98AE-41D7-A399-B9D5FED9E62B}" presName="descendantArrow" presStyleLbl="bgAccFollowNode1" presStyleIdx="5" presStyleCnt="6"/>
       <dgm:spPr/>
     </dgm:pt>
   </dgm:ptLst>
   <dgm:cxnLst>
     <dgm:cxn modelId="{1A08EC00-F668-814F-AF58-65A5D68F270C}" type="presOf" srcId="{B84C5BE4-2A53-4215-9F39-1CD907EFF2FE}" destId="{ACD11CC8-3600-994F-BDFB-C3AC67C3AAFA}" srcOrd="0" destOrd="0" presId="urn:microsoft.com/office/officeart/2016/7/layout/VerticalDownArrowProcess"/>
-    <dgm:cxn modelId="{51B5BA01-05DD-394D-80D1-3FCB1A0A183D}" type="presOf" srcId="{C2A21BE3-98AE-41D7-A399-B9D5FED9E62B}" destId="{18A12F9A-B809-4E4D-B47D-541BE911EAAF}" srcOrd="0" destOrd="0" presId="urn:microsoft.com/office/officeart/2016/7/layout/VerticalDownArrowProcess"/>
-    <dgm:cxn modelId="{5663C911-CF4E-6D48-B5DD-74CD5C157F47}" type="presOf" srcId="{65C3C378-CF6F-4042-A28B-40329047280A}" destId="{9C631705-1328-6B4E-8D56-E2DC8365389F}" srcOrd="0" destOrd="0" presId="urn:microsoft.com/office/officeart/2016/7/layout/VerticalDownArrowProcess"/>
-    <dgm:cxn modelId="{9FD5152C-460C-0B41-A595-3FFE31ABEAB0}" type="presOf" srcId="{7710CD6A-1A0B-44BE-9E6F-A4C073C6107B}" destId="{ED4C37FD-E652-5347-B245-F9D2404C50FB}" srcOrd="0" destOrd="0" presId="urn:microsoft.com/office/officeart/2016/7/layout/VerticalDownArrowProcess"/>
+    <dgm:cxn modelId="{FFCC8E01-E890-4040-97D9-761921EC5C15}" type="presOf" srcId="{542C14DC-AF38-4119-BA12-66E9F40F7A88}" destId="{83D2161C-C98E-4C68-8625-CB13007F97FC}" srcOrd="0" destOrd="0" presId="urn:microsoft.com/office/officeart/2016/7/layout/VerticalDownArrowProcess"/>
+    <dgm:cxn modelId="{A977701B-0B05-464D-AA5A-2977F7877CB7}" type="presOf" srcId="{F3D63710-AB9D-4152-862E-3E6E1A3AFA35}" destId="{82DD23EB-02DF-E94A-822D-DED26EC1DDF6}" srcOrd="0" destOrd="0" presId="urn:microsoft.com/office/officeart/2016/7/layout/VerticalDownArrowProcess"/>
     <dgm:cxn modelId="{1A8F362F-4233-4EB3-B49A-9C8ACE5AA5D8}" srcId="{B84C5BE4-2A53-4215-9F39-1CD907EFF2FE}" destId="{C2A21BE3-98AE-41D7-A399-B9D5FED9E62B}" srcOrd="0" destOrd="0" parTransId="{A717A1B5-75D9-427D-9CDE-B1C46928B8AC}" sibTransId="{4DF9318C-4A25-4B1A-A893-4C52A6E48E73}"/>
     <dgm:cxn modelId="{C672B83B-A2A9-47F7-9B14-F3B41FC4F462}" srcId="{4023C842-45FA-49AD-8CAA-75BCEEF7869E}" destId="{7710CD6A-1A0B-44BE-9E6F-A4C073C6107B}" srcOrd="0" destOrd="0" parTransId="{83A24318-CBD3-4F51-AF70-A6E06245F361}" sibTransId="{226C4521-2C44-4E38-B1C9-0BFC46314846}"/>
-    <dgm:cxn modelId="{63656A41-1D5B-7349-A085-02AC42A4C1D5}" type="presOf" srcId="{F3D63710-AB9D-4152-862E-3E6E1A3AFA35}" destId="{6F1816EA-C042-AC46-B05B-47202C60DE32}" srcOrd="1" destOrd="0" presId="urn:microsoft.com/office/officeart/2016/7/layout/VerticalDownArrowProcess"/>
-    <dgm:cxn modelId="{2A117E58-BBA1-C648-A4B3-DC2EB7E99DFB}" type="presOf" srcId="{63E1850E-9A76-49A6-B3CB-2465D0E361AA}" destId="{16ADB738-2B7D-BB49-B253-8C697AC25402}" srcOrd="0" destOrd="0" presId="urn:microsoft.com/office/officeart/2016/7/layout/VerticalDownArrowProcess"/>
-    <dgm:cxn modelId="{58965164-C346-8D4C-8F11-C2F9DA45D589}" type="presOf" srcId="{500D57A4-3805-4D88-8157-502910E68F89}" destId="{266821E8-9722-1944-98E2-A77BD95A2D71}" srcOrd="0" destOrd="0" presId="urn:microsoft.com/office/officeart/2016/7/layout/VerticalDownArrowProcess"/>
+    <dgm:cxn modelId="{03BE5941-A597-4A8B-87CE-3E59FDC558B7}" type="presOf" srcId="{88F1B4A4-2DAF-43BA-BE5A-7F7B6A58BE70}" destId="{A64E94A7-3257-4A22-BF68-E6378EB15A1C}" srcOrd="0" destOrd="0" presId="urn:microsoft.com/office/officeart/2016/7/layout/VerticalDownArrowProcess"/>
     <dgm:cxn modelId="{3C845E65-C4EA-4516-860C-A14C5EBB73F2}" srcId="{B84C5BE4-2A53-4215-9F39-1CD907EFF2FE}" destId="{4023C842-45FA-49AD-8CAA-75BCEEF7869E}" srcOrd="3" destOrd="0" parTransId="{2007ADE6-D7B1-4B27-95CB-C41597984DF7}" sibTransId="{3C7AA123-81E2-495A-A374-7CB359AEA844}"/>
-    <dgm:cxn modelId="{E523E283-0B2B-9340-9352-8411CE5F93C4}" type="presOf" srcId="{4E3CFE51-CC92-4B19-9945-B91CE7C106F3}" destId="{8B9DBE26-56BB-834B-94FE-F4C0F223A6A9}" srcOrd="0" destOrd="0" presId="urn:microsoft.com/office/officeart/2016/7/layout/VerticalDownArrowProcess"/>
+    <dgm:cxn modelId="{C49E2972-5B63-41A6-A11C-9E6308247B97}" type="presOf" srcId="{500D57A4-3805-4D88-8157-502910E68F89}" destId="{2C98E024-EA30-4940-86BB-1786E33B3386}" srcOrd="1" destOrd="0" presId="urn:microsoft.com/office/officeart/2016/7/layout/VerticalDownArrowProcess"/>
+    <dgm:cxn modelId="{53094453-4873-4E21-B1EF-BC4A8D8FA175}" type="presOf" srcId="{4E3CFE51-CC92-4B19-9945-B91CE7C106F3}" destId="{8B9DBE26-56BB-834B-94FE-F4C0F223A6A9}" srcOrd="0" destOrd="0" presId="urn:microsoft.com/office/officeart/2016/7/layout/VerticalDownArrowProcess"/>
+    <dgm:cxn modelId="{ECA43856-2F36-4D7B-BDCD-F05418E2253D}" type="presOf" srcId="{65C3C378-CF6F-4042-A28B-40329047280A}" destId="{9C631705-1328-6B4E-8D56-E2DC8365389F}" srcOrd="0" destOrd="0" presId="urn:microsoft.com/office/officeart/2016/7/layout/VerticalDownArrowProcess"/>
+    <dgm:cxn modelId="{61E96F83-8871-4C3A-9E82-7866C809A686}" type="presOf" srcId="{C2A21BE3-98AE-41D7-A399-B9D5FED9E62B}" destId="{29D6F870-D01B-3844-9017-D580A8ED4A41}" srcOrd="1" destOrd="0" presId="urn:microsoft.com/office/officeart/2016/7/layout/VerticalDownArrowProcess"/>
     <dgm:cxn modelId="{0D490584-5294-4935-9DA7-0469D5180BE5}" srcId="{500D57A4-3805-4D88-8157-502910E68F89}" destId="{4E3CFE51-CC92-4B19-9945-B91CE7C106F3}" srcOrd="0" destOrd="0" parTransId="{BB3C7786-9FC5-4BF3-B192-61B9D26F6DE4}" sibTransId="{91370E17-C9D8-418E-8530-F6BF7B93F45A}"/>
-    <dgm:cxn modelId="{9BAAD98D-6155-3F4A-A132-531CBC41F8B5}" type="presOf" srcId="{4023C842-45FA-49AD-8CAA-75BCEEF7869E}" destId="{2179E7BB-5544-AA45-89A4-77EE9A2D4A38}" srcOrd="0" destOrd="0" presId="urn:microsoft.com/office/officeart/2016/7/layout/VerticalDownArrowProcess"/>
-    <dgm:cxn modelId="{6CE8CC8E-0C0C-DC4D-9BCE-C3D47A0062B9}" type="presOf" srcId="{500D57A4-3805-4D88-8157-502910E68F89}" destId="{2C98E024-EA30-4940-86BB-1786E33B3386}" srcOrd="1" destOrd="0" presId="urn:microsoft.com/office/officeart/2016/7/layout/VerticalDownArrowProcess"/>
+    <dgm:cxn modelId="{6053E485-98D8-47CC-9930-CE0C0281060C}" type="presOf" srcId="{500D57A4-3805-4D88-8157-502910E68F89}" destId="{266821E8-9722-1944-98E2-A77BD95A2D71}" srcOrd="0" destOrd="0" presId="urn:microsoft.com/office/officeart/2016/7/layout/VerticalDownArrowProcess"/>
+    <dgm:cxn modelId="{83219487-70C8-4553-BDB0-B608072BC1F4}" type="presOf" srcId="{4023C842-45FA-49AD-8CAA-75BCEEF7869E}" destId="{71D90824-5929-4253-9DD4-B45EFFB3F875}" srcOrd="1" destOrd="0" presId="urn:microsoft.com/office/officeart/2016/7/layout/VerticalDownArrowProcess"/>
+    <dgm:cxn modelId="{1097A399-164A-4C82-959E-BD41594865EA}" type="presOf" srcId="{63E1850E-9A76-49A6-B3CB-2465D0E361AA}" destId="{16ADB738-2B7D-BB49-B253-8C697AC25402}" srcOrd="0" destOrd="0" presId="urn:microsoft.com/office/officeart/2016/7/layout/VerticalDownArrowProcess"/>
     <dgm:cxn modelId="{FBCDF999-7184-4F46-9C93-9E6D84BA34B0}" srcId="{B84C5BE4-2A53-4215-9F39-1CD907EFF2FE}" destId="{F3D63710-AB9D-4152-862E-3E6E1A3AFA35}" srcOrd="2" destOrd="0" parTransId="{8C905BE6-7311-4119-ACAC-03EEC81CCD98}" sibTransId="{1D15EEAD-748B-4558-A65A-D50823829A31}"/>
     <dgm:cxn modelId="{761B8AA7-361C-44F6-B298-3FA15909761C}" srcId="{B84C5BE4-2A53-4215-9F39-1CD907EFF2FE}" destId="{500D57A4-3805-4D88-8157-502910E68F89}" srcOrd="1" destOrd="0" parTransId="{3120702A-24C4-4A91-A649-79772B217E04}" sibTransId="{AA120DC0-47ED-4AB7-B4BF-D38FCB0E1D62}"/>
+    <dgm:cxn modelId="{E81F2FA8-50AC-4762-A621-862FB755A92D}" type="presOf" srcId="{7710CD6A-1A0B-44BE-9E6F-A4C073C6107B}" destId="{CF1C78FE-D127-4DDE-9FE4-78FF94448E8F}" srcOrd="0" destOrd="0" presId="urn:microsoft.com/office/officeart/2016/7/layout/VerticalDownArrowProcess"/>
     <dgm:cxn modelId="{183DB3AD-D279-43C9-B323-8CF27B1A2119}" srcId="{C2A21BE3-98AE-41D7-A399-B9D5FED9E62B}" destId="{65C3C378-CF6F-4042-A28B-40329047280A}" srcOrd="0" destOrd="0" parTransId="{F4AC905E-DE39-456E-B5D2-0439EAF10472}" sibTransId="{F9428FA9-E8E4-478E-AB1A-1D2E0ED2B4C7}"/>
-    <dgm:cxn modelId="{97A88CAF-D9BD-1144-9992-5C1C287E0210}" type="presOf" srcId="{F3D63710-AB9D-4152-862E-3E6E1A3AFA35}" destId="{82DD23EB-02DF-E94A-822D-DED26EC1DDF6}" srcOrd="0" destOrd="0" presId="urn:microsoft.com/office/officeart/2016/7/layout/VerticalDownArrowProcess"/>
+    <dgm:cxn modelId="{1A2A5BBA-18EF-4054-B6FB-8CA0A977961E}" type="presOf" srcId="{542C14DC-AF38-4119-BA12-66E9F40F7A88}" destId="{478A46B8-D9DF-4AA6-8F34-92BA0C18D709}" srcOrd="1" destOrd="0" presId="urn:microsoft.com/office/officeart/2016/7/layout/VerticalDownArrowProcess"/>
+    <dgm:cxn modelId="{0D5369BB-B086-4A08-BCCE-DCEDF415B5D9}" type="presOf" srcId="{A37E84B3-C289-4FAC-9F93-7653C447AE33}" destId="{08DA8AE2-FD40-4AFF-B0B6-DFBDF8B91469}" srcOrd="0" destOrd="0" presId="urn:microsoft.com/office/officeart/2016/7/layout/VerticalDownArrowProcess"/>
+    <dgm:cxn modelId="{E9EEF4BD-29E9-4FAE-B887-E2CAC3D7C9E3}" type="presOf" srcId="{FF942839-4A2E-426A-A696-EB22EC29DCA6}" destId="{192BFB00-CDC3-49D8-A0F1-006005A2CA20}" srcOrd="0" destOrd="0" presId="urn:microsoft.com/office/officeart/2016/7/layout/VerticalDownArrowProcess"/>
+    <dgm:cxn modelId="{6C8789C1-6F02-4DD5-BCC1-16AD98637B1F}" srcId="{542C14DC-AF38-4119-BA12-66E9F40F7A88}" destId="{88F1B4A4-2DAF-43BA-BE5A-7F7B6A58BE70}" srcOrd="0" destOrd="0" parTransId="{7AA3FBA2-29CD-409A-A55C-68CBDE5DBBF9}" sibTransId="{0197D9BB-9AC8-490A-8EB5-AC1D54D8AA52}"/>
+    <dgm:cxn modelId="{B1E995C2-B19E-4F1A-A019-284A9B8AE8A4}" srcId="{A37E84B3-C289-4FAC-9F93-7653C447AE33}" destId="{FF942839-4A2E-426A-A696-EB22EC29DCA6}" srcOrd="0" destOrd="0" parTransId="{9519ABE1-ABDD-4D98-8DD5-45CABE2C0E2B}" sibTransId="{C2B5D8AF-D86D-4B1B-BF91-00F5B4B7E743}"/>
+    <dgm:cxn modelId="{2D52C8D4-18B8-411D-8B1F-8E34F3C89F30}" type="presOf" srcId="{C2A21BE3-98AE-41D7-A399-B9D5FED9E62B}" destId="{18A12F9A-B809-4E4D-B47D-541BE911EAAF}" srcOrd="0" destOrd="0" presId="urn:microsoft.com/office/officeart/2016/7/layout/VerticalDownArrowProcess"/>
     <dgm:cxn modelId="{276821DB-ECAC-4850-8A65-A4FEA4FD19DC}" srcId="{F3D63710-AB9D-4152-862E-3E6E1A3AFA35}" destId="{63E1850E-9A76-49A6-B3CB-2465D0E361AA}" srcOrd="0" destOrd="0" parTransId="{DDEEE0E1-A551-4303-88A9-E9CAAFB4A7CA}" sibTransId="{1ACB3CE4-7AA0-4899-994B-34348D49F054}"/>
-    <dgm:cxn modelId="{66C619E7-0445-1841-8833-80D3B6DD83B4}" type="presOf" srcId="{C2A21BE3-98AE-41D7-A399-B9D5FED9E62B}" destId="{29D6F870-D01B-3844-9017-D580A8ED4A41}" srcOrd="1" destOrd="0" presId="urn:microsoft.com/office/officeart/2016/7/layout/VerticalDownArrowProcess"/>
-    <dgm:cxn modelId="{FCB0992A-B5AB-1745-8239-6A000A1F81A1}" type="presParOf" srcId="{ACD11CC8-3600-994F-BDFB-C3AC67C3AAFA}" destId="{0D3AAEE1-D32A-DD40-8125-A74A99224CE3}" srcOrd="0" destOrd="0" presId="urn:microsoft.com/office/officeart/2016/7/layout/VerticalDownArrowProcess"/>
-    <dgm:cxn modelId="{1B2AC67B-4F3C-BD44-B394-551C8F96A343}" type="presParOf" srcId="{0D3AAEE1-D32A-DD40-8125-A74A99224CE3}" destId="{2179E7BB-5544-AA45-89A4-77EE9A2D4A38}" srcOrd="0" destOrd="0" presId="urn:microsoft.com/office/officeart/2016/7/layout/VerticalDownArrowProcess"/>
-    <dgm:cxn modelId="{431C9B78-7966-2447-AB78-9C8AC8BC2C9E}" type="presParOf" srcId="{0D3AAEE1-D32A-DD40-8125-A74A99224CE3}" destId="{ED4C37FD-E652-5347-B245-F9D2404C50FB}" srcOrd="1" destOrd="0" presId="urn:microsoft.com/office/officeart/2016/7/layout/VerticalDownArrowProcess"/>
-    <dgm:cxn modelId="{3B15A016-0938-6043-B803-C1A3327033EC}" type="presParOf" srcId="{ACD11CC8-3600-994F-BDFB-C3AC67C3AAFA}" destId="{448A6327-F029-8A4E-AC64-9ECCA261F385}" srcOrd="1" destOrd="0" presId="urn:microsoft.com/office/officeart/2016/7/layout/VerticalDownArrowProcess"/>
-    <dgm:cxn modelId="{1FE6B3BB-0D28-DC43-80D2-197B7B56AD3A}" type="presParOf" srcId="{ACD11CC8-3600-994F-BDFB-C3AC67C3AAFA}" destId="{B062CF96-0150-0B42-8F11-687D25FF3056}" srcOrd="2" destOrd="0" presId="urn:microsoft.com/office/officeart/2016/7/layout/VerticalDownArrowProcess"/>
-    <dgm:cxn modelId="{C99739E8-E64F-CB48-B0D9-BCE6008981A0}" type="presParOf" srcId="{B062CF96-0150-0B42-8F11-687D25FF3056}" destId="{82DD23EB-02DF-E94A-822D-DED26EC1DDF6}" srcOrd="0" destOrd="0" presId="urn:microsoft.com/office/officeart/2016/7/layout/VerticalDownArrowProcess"/>
-    <dgm:cxn modelId="{D5419591-E029-624E-9C43-F7EA99F6F60D}" type="presParOf" srcId="{B062CF96-0150-0B42-8F11-687D25FF3056}" destId="{6F1816EA-C042-AC46-B05B-47202C60DE32}" srcOrd="1" destOrd="0" presId="urn:microsoft.com/office/officeart/2016/7/layout/VerticalDownArrowProcess"/>
-    <dgm:cxn modelId="{B6A83656-3202-FA44-865A-A8104F3394CA}" type="presParOf" srcId="{B062CF96-0150-0B42-8F11-687D25FF3056}" destId="{16ADB738-2B7D-BB49-B253-8C697AC25402}" srcOrd="2" destOrd="0" presId="urn:microsoft.com/office/officeart/2016/7/layout/VerticalDownArrowProcess"/>
-    <dgm:cxn modelId="{821091B8-BC79-164A-B001-F346AC8B6987}" type="presParOf" srcId="{ACD11CC8-3600-994F-BDFB-C3AC67C3AAFA}" destId="{03B146D7-6B63-FC48-B714-F992432CFE82}" srcOrd="3" destOrd="0" presId="urn:microsoft.com/office/officeart/2016/7/layout/VerticalDownArrowProcess"/>
-    <dgm:cxn modelId="{102BCD8C-93EA-934A-977A-D14FA4187DAB}" type="presParOf" srcId="{ACD11CC8-3600-994F-BDFB-C3AC67C3AAFA}" destId="{FC68B083-3E9C-F54F-8701-6BD6BB8A39B3}" srcOrd="4" destOrd="0" presId="urn:microsoft.com/office/officeart/2016/7/layout/VerticalDownArrowProcess"/>
-    <dgm:cxn modelId="{D10674B2-BE1C-2F40-9944-B8159580D0B2}" type="presParOf" srcId="{FC68B083-3E9C-F54F-8701-6BD6BB8A39B3}" destId="{266821E8-9722-1944-98E2-A77BD95A2D71}" srcOrd="0" destOrd="0" presId="urn:microsoft.com/office/officeart/2016/7/layout/VerticalDownArrowProcess"/>
-    <dgm:cxn modelId="{06004868-FB02-0949-9FC9-EC5774E2AB3D}" type="presParOf" srcId="{FC68B083-3E9C-F54F-8701-6BD6BB8A39B3}" destId="{2C98E024-EA30-4940-86BB-1786E33B3386}" srcOrd="1" destOrd="0" presId="urn:microsoft.com/office/officeart/2016/7/layout/VerticalDownArrowProcess"/>
-    <dgm:cxn modelId="{DC0A0069-F9AC-6448-83D9-55B9EF394B31}" type="presParOf" srcId="{FC68B083-3E9C-F54F-8701-6BD6BB8A39B3}" destId="{8B9DBE26-56BB-834B-94FE-F4C0F223A6A9}" srcOrd="2" destOrd="0" presId="urn:microsoft.com/office/officeart/2016/7/layout/VerticalDownArrowProcess"/>
-    <dgm:cxn modelId="{B586E12C-11E2-A647-B2F1-D57DEC53B74E}" type="presParOf" srcId="{ACD11CC8-3600-994F-BDFB-C3AC67C3AAFA}" destId="{6A7191F0-227B-6F46-A2A0-ECAEBC96D520}" srcOrd="5" destOrd="0" presId="urn:microsoft.com/office/officeart/2016/7/layout/VerticalDownArrowProcess"/>
-    <dgm:cxn modelId="{907E5D27-829A-4143-81C3-B1B286B1F765}" type="presParOf" srcId="{ACD11CC8-3600-994F-BDFB-C3AC67C3AAFA}" destId="{18BE90DB-E2A6-FD4C-89AC-DF960166E3B1}" srcOrd="6" destOrd="0" presId="urn:microsoft.com/office/officeart/2016/7/layout/VerticalDownArrowProcess"/>
-    <dgm:cxn modelId="{44653DB2-997B-414A-B49E-F774E2D52775}" type="presParOf" srcId="{18BE90DB-E2A6-FD4C-89AC-DF960166E3B1}" destId="{18A12F9A-B809-4E4D-B47D-541BE911EAAF}" srcOrd="0" destOrd="0" presId="urn:microsoft.com/office/officeart/2016/7/layout/VerticalDownArrowProcess"/>
-    <dgm:cxn modelId="{5DBC6344-FF49-294D-8F4E-6B1C04F5FD1F}" type="presParOf" srcId="{18BE90DB-E2A6-FD4C-89AC-DF960166E3B1}" destId="{29D6F870-D01B-3844-9017-D580A8ED4A41}" srcOrd="1" destOrd="0" presId="urn:microsoft.com/office/officeart/2016/7/layout/VerticalDownArrowProcess"/>
-    <dgm:cxn modelId="{5EFE2002-C37A-F94A-B8AE-E56D5AC5B1ED}" type="presParOf" srcId="{18BE90DB-E2A6-FD4C-89AC-DF960166E3B1}" destId="{9C631705-1328-6B4E-8D56-E2DC8365389F}" srcOrd="2" destOrd="0" presId="urn:microsoft.com/office/officeart/2016/7/layout/VerticalDownArrowProcess"/>
+    <dgm:cxn modelId="{368B6EDD-6F73-40F2-8609-481625A6DBCB}" type="presOf" srcId="{F3D63710-AB9D-4152-862E-3E6E1A3AFA35}" destId="{6F1816EA-C042-AC46-B05B-47202C60DE32}" srcOrd="1" destOrd="0" presId="urn:microsoft.com/office/officeart/2016/7/layout/VerticalDownArrowProcess"/>
+    <dgm:cxn modelId="{5DE172F0-15FD-4C80-885A-1536CBA5B3B8}" srcId="{B84C5BE4-2A53-4215-9F39-1CD907EFF2FE}" destId="{542C14DC-AF38-4119-BA12-66E9F40F7A88}" srcOrd="4" destOrd="0" parTransId="{B6B69D4D-37D7-45DC-B131-E69E1115A498}" sibTransId="{54F262F2-63B4-43A6-BF81-6B10BF78D802}"/>
+    <dgm:cxn modelId="{C75EBCF0-A8CE-403E-92C8-76AFE7B358F6}" srcId="{B84C5BE4-2A53-4215-9F39-1CD907EFF2FE}" destId="{A37E84B3-C289-4FAC-9F93-7653C447AE33}" srcOrd="5" destOrd="0" parTransId="{8769CD14-C9BF-4B8A-BC1E-9FE89EC515F8}" sibTransId="{D8F41B40-3BCA-4F34-B653-0FCBD1B7A387}"/>
+    <dgm:cxn modelId="{2BCAEEFF-1CCA-4ACF-BE89-E4601D373C9F}" type="presOf" srcId="{4023C842-45FA-49AD-8CAA-75BCEEF7869E}" destId="{F369EE7D-A924-4099-AEF0-4A12C2A2D6F7}" srcOrd="0" destOrd="0" presId="urn:microsoft.com/office/officeart/2016/7/layout/VerticalDownArrowProcess"/>
+    <dgm:cxn modelId="{0E38B589-7E15-42F7-89A9-817D717A27A2}" type="presParOf" srcId="{ACD11CC8-3600-994F-BDFB-C3AC67C3AAFA}" destId="{2224D17D-E179-4141-AE13-F15D51804184}" srcOrd="0" destOrd="0" presId="urn:microsoft.com/office/officeart/2016/7/layout/VerticalDownArrowProcess"/>
+    <dgm:cxn modelId="{BFF0F958-D6EF-4E65-9823-4E4F4B539FC5}" type="presParOf" srcId="{2224D17D-E179-4141-AE13-F15D51804184}" destId="{08DA8AE2-FD40-4AFF-B0B6-DFBDF8B91469}" srcOrd="0" destOrd="0" presId="urn:microsoft.com/office/officeart/2016/7/layout/VerticalDownArrowProcess"/>
+    <dgm:cxn modelId="{018AE961-6E03-4446-AE6C-C7B290CE5143}" type="presParOf" srcId="{2224D17D-E179-4141-AE13-F15D51804184}" destId="{192BFB00-CDC3-49D8-A0F1-006005A2CA20}" srcOrd="1" destOrd="0" presId="urn:microsoft.com/office/officeart/2016/7/layout/VerticalDownArrowProcess"/>
+    <dgm:cxn modelId="{05CCEB40-0D6B-4950-99AA-77DD3F039B53}" type="presParOf" srcId="{ACD11CC8-3600-994F-BDFB-C3AC67C3AAFA}" destId="{31B35502-C7FD-49EC-98CA-010625D12865}" srcOrd="1" destOrd="0" presId="urn:microsoft.com/office/officeart/2016/7/layout/VerticalDownArrowProcess"/>
+    <dgm:cxn modelId="{D59B680F-1DF9-4DAE-8BF8-77D26F41ED10}" type="presParOf" srcId="{ACD11CC8-3600-994F-BDFB-C3AC67C3AAFA}" destId="{296B988D-D2B0-43B5-85DE-E375E039E384}" srcOrd="2" destOrd="0" presId="urn:microsoft.com/office/officeart/2016/7/layout/VerticalDownArrowProcess"/>
+    <dgm:cxn modelId="{DE5E8065-53EE-49D8-88AC-BD6672BF2305}" type="presParOf" srcId="{296B988D-D2B0-43B5-85DE-E375E039E384}" destId="{83D2161C-C98E-4C68-8625-CB13007F97FC}" srcOrd="0" destOrd="0" presId="urn:microsoft.com/office/officeart/2016/7/layout/VerticalDownArrowProcess"/>
+    <dgm:cxn modelId="{3A356D25-2EF1-4624-AE09-86B8D3034C2F}" type="presParOf" srcId="{296B988D-D2B0-43B5-85DE-E375E039E384}" destId="{478A46B8-D9DF-4AA6-8F34-92BA0C18D709}" srcOrd="1" destOrd="0" presId="urn:microsoft.com/office/officeart/2016/7/layout/VerticalDownArrowProcess"/>
+    <dgm:cxn modelId="{0BC5B43E-BD2C-41B3-8EA1-ED2EEFB2490A}" type="presParOf" srcId="{296B988D-D2B0-43B5-85DE-E375E039E384}" destId="{A64E94A7-3257-4A22-BF68-E6378EB15A1C}" srcOrd="2" destOrd="0" presId="urn:microsoft.com/office/officeart/2016/7/layout/VerticalDownArrowProcess"/>
+    <dgm:cxn modelId="{70B38F66-0B58-46F2-AA88-F58B4E61DBC7}" type="presParOf" srcId="{ACD11CC8-3600-994F-BDFB-C3AC67C3AAFA}" destId="{AAD1A3C0-32B6-42DD-B8BD-62DA11A60FB8}" srcOrd="3" destOrd="0" presId="urn:microsoft.com/office/officeart/2016/7/layout/VerticalDownArrowProcess"/>
+    <dgm:cxn modelId="{074D6E84-CA80-4B88-BEA7-9B381078C3C8}" type="presParOf" srcId="{ACD11CC8-3600-994F-BDFB-C3AC67C3AAFA}" destId="{E02B59A0-DB52-4425-8D58-3E4D3D2F1363}" srcOrd="4" destOrd="0" presId="urn:microsoft.com/office/officeart/2016/7/layout/VerticalDownArrowProcess"/>
+    <dgm:cxn modelId="{833A07BC-4FEC-4319-AA8E-DC3B48036CBC}" type="presParOf" srcId="{E02B59A0-DB52-4425-8D58-3E4D3D2F1363}" destId="{F369EE7D-A924-4099-AEF0-4A12C2A2D6F7}" srcOrd="0" destOrd="0" presId="urn:microsoft.com/office/officeart/2016/7/layout/VerticalDownArrowProcess"/>
+    <dgm:cxn modelId="{FFA148F7-10CD-4269-9A96-569D82054597}" type="presParOf" srcId="{E02B59A0-DB52-4425-8D58-3E4D3D2F1363}" destId="{71D90824-5929-4253-9DD4-B45EFFB3F875}" srcOrd="1" destOrd="0" presId="urn:microsoft.com/office/officeart/2016/7/layout/VerticalDownArrowProcess"/>
+    <dgm:cxn modelId="{4D05D86A-EA0D-49E6-8AC3-FF7B8F001FFB}" type="presParOf" srcId="{E02B59A0-DB52-4425-8D58-3E4D3D2F1363}" destId="{CF1C78FE-D127-4DDE-9FE4-78FF94448E8F}" srcOrd="2" destOrd="0" presId="urn:microsoft.com/office/officeart/2016/7/layout/VerticalDownArrowProcess"/>
+    <dgm:cxn modelId="{1F6296AE-B2AE-41B1-983D-1900774506D6}" type="presParOf" srcId="{ACD11CC8-3600-994F-BDFB-C3AC67C3AAFA}" destId="{448A6327-F029-8A4E-AC64-9ECCA261F385}" srcOrd="5" destOrd="0" presId="urn:microsoft.com/office/officeart/2016/7/layout/VerticalDownArrowProcess"/>
+    <dgm:cxn modelId="{0F2BB56E-4E08-4867-BD4A-F7F532EB40C0}" type="presParOf" srcId="{ACD11CC8-3600-994F-BDFB-C3AC67C3AAFA}" destId="{B062CF96-0150-0B42-8F11-687D25FF3056}" srcOrd="6" destOrd="0" presId="urn:microsoft.com/office/officeart/2016/7/layout/VerticalDownArrowProcess"/>
+    <dgm:cxn modelId="{A2B024AB-6E3C-4784-AC79-5FFEAF887B03}" type="presParOf" srcId="{B062CF96-0150-0B42-8F11-687D25FF3056}" destId="{82DD23EB-02DF-E94A-822D-DED26EC1DDF6}" srcOrd="0" destOrd="0" presId="urn:microsoft.com/office/officeart/2016/7/layout/VerticalDownArrowProcess"/>
+    <dgm:cxn modelId="{77B9526F-301A-4D4C-BD36-1592A073253B}" type="presParOf" srcId="{B062CF96-0150-0B42-8F11-687D25FF3056}" destId="{6F1816EA-C042-AC46-B05B-47202C60DE32}" srcOrd="1" destOrd="0" presId="urn:microsoft.com/office/officeart/2016/7/layout/VerticalDownArrowProcess"/>
+    <dgm:cxn modelId="{F2696130-5558-4838-8487-7AF6AE3A649D}" type="presParOf" srcId="{B062CF96-0150-0B42-8F11-687D25FF3056}" destId="{16ADB738-2B7D-BB49-B253-8C697AC25402}" srcOrd="2" destOrd="0" presId="urn:microsoft.com/office/officeart/2016/7/layout/VerticalDownArrowProcess"/>
+    <dgm:cxn modelId="{99CBFD5E-184C-4FE6-A77B-EF2CD34C35BC}" type="presParOf" srcId="{ACD11CC8-3600-994F-BDFB-C3AC67C3AAFA}" destId="{03B146D7-6B63-FC48-B714-F992432CFE82}" srcOrd="7" destOrd="0" presId="urn:microsoft.com/office/officeart/2016/7/layout/VerticalDownArrowProcess"/>
+    <dgm:cxn modelId="{07C723E5-9389-478D-87C3-60EE0A3822CF}" type="presParOf" srcId="{ACD11CC8-3600-994F-BDFB-C3AC67C3AAFA}" destId="{FC68B083-3E9C-F54F-8701-6BD6BB8A39B3}" srcOrd="8" destOrd="0" presId="urn:microsoft.com/office/officeart/2016/7/layout/VerticalDownArrowProcess"/>
+    <dgm:cxn modelId="{7662CA2F-DF99-4C5D-9FCC-4BD860CA7205}" type="presParOf" srcId="{FC68B083-3E9C-F54F-8701-6BD6BB8A39B3}" destId="{266821E8-9722-1944-98E2-A77BD95A2D71}" srcOrd="0" destOrd="0" presId="urn:microsoft.com/office/officeart/2016/7/layout/VerticalDownArrowProcess"/>
+    <dgm:cxn modelId="{0E72E2F7-1E94-40BD-A98F-34888A4B567C}" type="presParOf" srcId="{FC68B083-3E9C-F54F-8701-6BD6BB8A39B3}" destId="{2C98E024-EA30-4940-86BB-1786E33B3386}" srcOrd="1" destOrd="0" presId="urn:microsoft.com/office/officeart/2016/7/layout/VerticalDownArrowProcess"/>
+    <dgm:cxn modelId="{0EB95DEA-F5CD-4138-8BD0-798526729B2C}" type="presParOf" srcId="{FC68B083-3E9C-F54F-8701-6BD6BB8A39B3}" destId="{8B9DBE26-56BB-834B-94FE-F4C0F223A6A9}" srcOrd="2" destOrd="0" presId="urn:microsoft.com/office/officeart/2016/7/layout/VerticalDownArrowProcess"/>
+    <dgm:cxn modelId="{5D0D1CED-1B4B-4986-999A-60C893BE41D4}" type="presParOf" srcId="{ACD11CC8-3600-994F-BDFB-C3AC67C3AAFA}" destId="{6A7191F0-227B-6F46-A2A0-ECAEBC96D520}" srcOrd="9" destOrd="0" presId="urn:microsoft.com/office/officeart/2016/7/layout/VerticalDownArrowProcess"/>
+    <dgm:cxn modelId="{4B09A541-A597-4456-A047-4D53586D104E}" type="presParOf" srcId="{ACD11CC8-3600-994F-BDFB-C3AC67C3AAFA}" destId="{18BE90DB-E2A6-FD4C-89AC-DF960166E3B1}" srcOrd="10" destOrd="0" presId="urn:microsoft.com/office/officeart/2016/7/layout/VerticalDownArrowProcess"/>
+    <dgm:cxn modelId="{2B794973-CB92-45D1-B3E2-6E73EC83ABB4}" type="presParOf" srcId="{18BE90DB-E2A6-FD4C-89AC-DF960166E3B1}" destId="{18A12F9A-B809-4E4D-B47D-541BE911EAAF}" srcOrd="0" destOrd="0" presId="urn:microsoft.com/office/officeart/2016/7/layout/VerticalDownArrowProcess"/>
+    <dgm:cxn modelId="{C1E04433-60E1-42C1-B455-27C46CE656D1}" type="presParOf" srcId="{18BE90DB-E2A6-FD4C-89AC-DF960166E3B1}" destId="{29D6F870-D01B-3844-9017-D580A8ED4A41}" srcOrd="1" destOrd="0" presId="urn:microsoft.com/office/officeart/2016/7/layout/VerticalDownArrowProcess"/>
+    <dgm:cxn modelId="{25089740-7F27-41EF-97EF-E9DD7F5EEF23}" type="presParOf" srcId="{18BE90DB-E2A6-FD4C-89AC-DF960166E3B1}" destId="{9C631705-1328-6B4E-8D56-E2DC8365389F}" srcOrd="2" destOrd="0" presId="urn:microsoft.com/office/officeart/2016/7/layout/VerticalDownArrowProcess"/>
   </dgm:cxnLst>
   <dgm:bg/>
   <dgm:whole/>
@@ -12457,10 +12646,10 @@
     <dgm:cxn modelId="{B8BDDA25-9FC6-4982-B39C-210DEFC22D29}" srcId="{5DBBABB6-E63E-46EC-908B-BEDC7D794DBC}" destId="{772CF2C3-187A-48FE-A20F-C460394A71F5}" srcOrd="0" destOrd="0" parTransId="{E78CF61D-1E20-4AA0-ABFE-3CCA7D6C54C8}" sibTransId="{56F00EA1-AA5D-48EA-A5FE-63388CE08AF6}"/>
     <dgm:cxn modelId="{A1573326-0033-6948-BA82-CB79D9310EF7}" type="presOf" srcId="{772CF2C3-187A-48FE-A20F-C460394A71F5}" destId="{F1F6681E-8B98-E245-BEB3-1CE8B2FA601F}" srcOrd="0" destOrd="0" presId="urn:microsoft.com/office/officeart/2005/8/layout/cycle6"/>
     <dgm:cxn modelId="{D916133D-060D-3042-9E38-12BBE1C436EC}" type="presOf" srcId="{1BEA9069-8CE4-4E7F-8C96-9691F64029AF}" destId="{2FA0F395-561F-014B-89A4-28DA265A4F80}" srcOrd="0" destOrd="0" presId="urn:microsoft.com/office/officeart/2005/8/layout/cycle6"/>
+    <dgm:cxn modelId="{E579A75B-C3E4-1040-AE75-6DABD668D364}" type="presOf" srcId="{9CCCF17D-19F2-4991-8672-FC4D3E86C44E}" destId="{43548B0E-10EF-024D-A749-787ADB3021C1}" srcOrd="0" destOrd="0" presId="urn:microsoft.com/office/officeart/2005/8/layout/cycle6"/>
+    <dgm:cxn modelId="{1615FB5D-FA03-4116-8171-2692B1E78EAC}" srcId="{5DBBABB6-E63E-46EC-908B-BEDC7D794DBC}" destId="{9CCCF17D-19F2-4991-8672-FC4D3E86C44E}" srcOrd="1" destOrd="0" parTransId="{E06E457D-46E8-444F-8AB5-A524B9016ACD}" sibTransId="{1BEA9069-8CE4-4E7F-8C96-9691F64029AF}"/>
     <dgm:cxn modelId="{E81B6E45-09A1-224A-B2E6-3CF3A1633F47}" type="presOf" srcId="{C647EFCB-4B43-4101-8710-8798DB808388}" destId="{7FB1965A-D20D-0A47-AF54-9D5A72FE29ED}" srcOrd="0" destOrd="0" presId="urn:microsoft.com/office/officeart/2005/8/layout/cycle6"/>
     <dgm:cxn modelId="{550E2E4A-9661-5749-A929-25755982F4BA}" type="presOf" srcId="{7430BE01-1135-4AA4-A93A-8F3B0BFEB1C5}" destId="{F7A0EBF1-FA41-3B48-B6AA-5BA01F197D18}" srcOrd="0" destOrd="0" presId="urn:microsoft.com/office/officeart/2005/8/layout/cycle6"/>
-    <dgm:cxn modelId="{E579A75B-C3E4-1040-AE75-6DABD668D364}" type="presOf" srcId="{9CCCF17D-19F2-4991-8672-FC4D3E86C44E}" destId="{43548B0E-10EF-024D-A749-787ADB3021C1}" srcOrd="0" destOrd="0" presId="urn:microsoft.com/office/officeart/2005/8/layout/cycle6"/>
-    <dgm:cxn modelId="{1615FB5D-FA03-4116-8171-2692B1E78EAC}" srcId="{5DBBABB6-E63E-46EC-908B-BEDC7D794DBC}" destId="{9CCCF17D-19F2-4991-8672-FC4D3E86C44E}" srcOrd="1" destOrd="0" parTransId="{E06E457D-46E8-444F-8AB5-A524B9016ACD}" sibTransId="{1BEA9069-8CE4-4E7F-8C96-9691F64029AF}"/>
     <dgm:cxn modelId="{5283B76A-F676-4927-8548-175C3B649D63}" srcId="{5DBBABB6-E63E-46EC-908B-BEDC7D794DBC}" destId="{3ECB368A-B335-4400-BDAB-CC51E4640DA9}" srcOrd="2" destOrd="0" parTransId="{83EFCE12-0213-4CFB-AA1D-5B0825757906}" sibTransId="{4BDC1FD1-ED04-461F-838D-616E3AB9156F}"/>
     <dgm:cxn modelId="{5149F46C-F6E0-9643-9557-B66F02DEE726}" type="presOf" srcId="{4BDC1FD1-ED04-461F-838D-616E3AB9156F}" destId="{C56CB2B2-A9D1-7C48-9D36-3A9E2989E863}" srcOrd="0" destOrd="0" presId="urn:microsoft.com/office/officeart/2005/8/layout/cycle6"/>
     <dgm:cxn modelId="{F5CDF49D-E198-1544-A8EA-E764139C0B50}" type="presOf" srcId="{3ECB368A-B335-4400-BDAB-CC51E4640DA9}" destId="{0E4AFCB6-B93A-5A4D-AE61-2E063E7DFE2B}" srcOrd="0" destOrd="0" presId="urn:microsoft.com/office/officeart/2005/8/layout/cycle6"/>
@@ -12689,7 +12878,7 @@
 <dgm:dataModel xmlns:dgm="http://schemas.openxmlformats.org/drawingml/2006/diagram" xmlns:a="http://schemas.openxmlformats.org/drawingml/2006/main">
   <dgm:ptLst>
     <dgm:pt modelId="{32E1119A-228F-48E4-97C8-711670653FBA}" type="doc">
-      <dgm:prSet loTypeId="urn:microsoft.com/office/officeart/2005/8/layout/vList2" loCatId="list" qsTypeId="urn:microsoft.com/office/officeart/2005/8/quickstyle/simple1" qsCatId="simple" csTypeId="urn:microsoft.com/office/officeart/2005/8/colors/colorful2" csCatId="colorful"/>
+      <dgm:prSet loTypeId="urn:microsoft.com/office/officeart/2005/8/layout/vList2" loCatId="list" qsTypeId="urn:microsoft.com/office/officeart/2005/8/quickstyle/simple1" qsCatId="simple" csTypeId="urn:microsoft.com/office/officeart/2005/8/colors/colorful2" csCatId="colorful" phldr="1"/>
       <dgm:spPr/>
       <dgm:t>
         <a:bodyPr/>
@@ -12707,10 +12896,10 @@
         <a:lstStyle/>
         <a:p>
           <a:r>
-            <a:rPr lang="en-IN"/>
+            <a:rPr lang="en-IN" dirty="0"/>
             <a:t>Models Used:</a:t>
           </a:r>
-          <a:endParaRPr lang="en-US"/>
+          <a:endParaRPr lang="en-US" dirty="0"/>
         </a:p>
       </dgm:t>
     </dgm:pt>
@@ -12744,8 +12933,8 @@
         <a:lstStyle/>
         <a:p>
           <a:r>
-            <a:rPr lang="en-US"/>
-            <a:t>Logistic Regression</a:t>
+            <a:rPr lang="en-US" dirty="0"/>
+            <a:t>Naïve Bayes</a:t>
           </a:r>
         </a:p>
       </dgm:t>
@@ -12780,7 +12969,7 @@
         <a:lstStyle/>
         <a:p>
           <a:r>
-            <a:rPr lang="en-US"/>
+            <a:rPr lang="en-US" dirty="0"/>
             <a:t>Decision Tree</a:t>
           </a:r>
         </a:p>
@@ -12916,6 +13105,42 @@
         </a:p>
       </dgm:t>
     </dgm:pt>
+    <dgm:pt modelId="{0D4AB28C-20B8-4C35-8DFA-C1D183172433}">
+      <dgm:prSet/>
+      <dgm:spPr/>
+      <dgm:t>
+        <a:bodyPr/>
+        <a:lstStyle/>
+        <a:p>
+          <a:r>
+            <a:rPr lang="en-US" dirty="0"/>
+            <a:t>Logistic Regression</a:t>
+          </a:r>
+        </a:p>
+      </dgm:t>
+    </dgm:pt>
+    <dgm:pt modelId="{D6975C15-8176-4573-B243-882BA5BECC8B}" type="parTrans" cxnId="{A7CBCBCB-77BE-4FF3-976B-42A4B26237EE}">
+      <dgm:prSet/>
+      <dgm:spPr/>
+      <dgm:t>
+        <a:bodyPr/>
+        <a:lstStyle/>
+        <a:p>
+          <a:endParaRPr lang="en-IN"/>
+        </a:p>
+      </dgm:t>
+    </dgm:pt>
+    <dgm:pt modelId="{CA922DFE-629B-40E3-91F4-33B9E429DDE7}" type="sibTrans" cxnId="{A7CBCBCB-77BE-4FF3-976B-42A4B26237EE}">
+      <dgm:prSet/>
+      <dgm:spPr/>
+      <dgm:t>
+        <a:bodyPr/>
+        <a:lstStyle/>
+        <a:p>
+          <a:endParaRPr lang="en-IN"/>
+        </a:p>
+      </dgm:t>
+    </dgm:pt>
     <dgm:pt modelId="{86EE79F4-C4FE-674F-B27E-6568B5784846}" type="pres">
       <dgm:prSet presAssocID="{32E1119A-228F-48E4-97C8-711670653FBA}" presName="linear" presStyleCnt="0">
         <dgm:presLayoutVars>
@@ -12945,14 +13170,16 @@
   </dgm:ptLst>
   <dgm:cxnLst>
     <dgm:cxn modelId="{6DCE5F18-A47C-DE43-9196-D5306BE31F7F}" type="presOf" srcId="{32E1119A-228F-48E4-97C8-711670653FBA}" destId="{86EE79F4-C4FE-674F-B27E-6568B5784846}" srcOrd="0" destOrd="0" presId="urn:microsoft.com/office/officeart/2005/8/layout/vList2"/>
-    <dgm:cxn modelId="{909DF244-CEA4-4213-BB76-C856BB61A430}" srcId="{A9CE11E1-9893-4DE8-99B4-FB57BD3F6257}" destId="{25A0D056-009E-46E4-AE6A-C8CD80DF32B8}" srcOrd="3" destOrd="0" parTransId="{42E3B0F1-BDC3-4499-8679-663FDB39206F}" sibTransId="{02A9F6C2-F327-43CE-BB26-D7C5E1D66B26}"/>
-    <dgm:cxn modelId="{1BDC4F62-765B-4A7A-9734-AEFAE19870E0}" srcId="{A9CE11E1-9893-4DE8-99B4-FB57BD3F6257}" destId="{988D6703-9E6C-45E0-BA07-57F456B5B991}" srcOrd="2" destOrd="0" parTransId="{71CB4F8F-6E38-4CE5-91B1-8BED81B31742}" sibTransId="{814933CF-DDFE-4028-ADD3-9D4640588C6F}"/>
-    <dgm:cxn modelId="{6384FD6A-FD0F-4DED-B6AF-30F8D019DAF2}" srcId="{A9CE11E1-9893-4DE8-99B4-FB57BD3F6257}" destId="{58BB93BC-2D58-4C11-9C0A-059125FC4640}" srcOrd="1" destOrd="0" parTransId="{5C7445C4-349F-4679-A5CB-C59233615757}" sibTransId="{B3C6258B-648D-478F-88ED-735DA77D4478}"/>
-    <dgm:cxn modelId="{68B23177-4389-2541-A17C-618151CA109D}" type="presOf" srcId="{58BB93BC-2D58-4C11-9C0A-059125FC4640}" destId="{DF700EFD-AB12-934B-BF04-1557CE80EAD5}" srcOrd="0" destOrd="1" presId="urn:microsoft.com/office/officeart/2005/8/layout/vList2"/>
-    <dgm:cxn modelId="{C970E781-3605-1D48-A4F6-70F76445912B}" type="presOf" srcId="{988D6703-9E6C-45E0-BA07-57F456B5B991}" destId="{DF700EFD-AB12-934B-BF04-1557CE80EAD5}" srcOrd="0" destOrd="2" presId="urn:microsoft.com/office/officeart/2005/8/layout/vList2"/>
-    <dgm:cxn modelId="{F92A728F-757E-428F-AFDF-F2A196A8E5A4}" srcId="{A9CE11E1-9893-4DE8-99B4-FB57BD3F6257}" destId="{D26151A0-A1A9-47FA-8DBD-2739FB3E61B6}" srcOrd="4" destOrd="0" parTransId="{E9BE9F33-8F4A-44FC-BC0C-3B213313CB0D}" sibTransId="{BE6F3B6C-FAD3-4EF3-BE01-2FECD9EDD620}"/>
-    <dgm:cxn modelId="{63C88BA3-3F94-B94C-B330-7AA61402AE3D}" type="presOf" srcId="{D26151A0-A1A9-47FA-8DBD-2739FB3E61B6}" destId="{DF700EFD-AB12-934B-BF04-1557CE80EAD5}" srcOrd="0" destOrd="4" presId="urn:microsoft.com/office/officeart/2005/8/layout/vList2"/>
-    <dgm:cxn modelId="{78C221BD-96BB-0B44-960D-9C7D10B8D04C}" type="presOf" srcId="{25A0D056-009E-46E4-AE6A-C8CD80DF32B8}" destId="{DF700EFD-AB12-934B-BF04-1557CE80EAD5}" srcOrd="0" destOrd="3" presId="urn:microsoft.com/office/officeart/2005/8/layout/vList2"/>
+    <dgm:cxn modelId="{22AEDF5B-6D18-4B4D-8BE5-E043D1395CD3}" type="presOf" srcId="{0D4AB28C-20B8-4C35-8DFA-C1D183172433}" destId="{DF700EFD-AB12-934B-BF04-1557CE80EAD5}" srcOrd="0" destOrd="1" presId="urn:microsoft.com/office/officeart/2005/8/layout/vList2"/>
+    <dgm:cxn modelId="{1BDC4F62-765B-4A7A-9734-AEFAE19870E0}" srcId="{A9CE11E1-9893-4DE8-99B4-FB57BD3F6257}" destId="{988D6703-9E6C-45E0-BA07-57F456B5B991}" srcOrd="3" destOrd="0" parTransId="{71CB4F8F-6E38-4CE5-91B1-8BED81B31742}" sibTransId="{814933CF-DDFE-4028-ADD3-9D4640588C6F}"/>
+    <dgm:cxn modelId="{909DF244-CEA4-4213-BB76-C856BB61A430}" srcId="{A9CE11E1-9893-4DE8-99B4-FB57BD3F6257}" destId="{25A0D056-009E-46E4-AE6A-C8CD80DF32B8}" srcOrd="4" destOrd="0" parTransId="{42E3B0F1-BDC3-4499-8679-663FDB39206F}" sibTransId="{02A9F6C2-F327-43CE-BB26-D7C5E1D66B26}"/>
+    <dgm:cxn modelId="{6384FD6A-FD0F-4DED-B6AF-30F8D019DAF2}" srcId="{A9CE11E1-9893-4DE8-99B4-FB57BD3F6257}" destId="{58BB93BC-2D58-4C11-9C0A-059125FC4640}" srcOrd="2" destOrd="0" parTransId="{5C7445C4-349F-4679-A5CB-C59233615757}" sibTransId="{B3C6258B-648D-478F-88ED-735DA77D4478}"/>
+    <dgm:cxn modelId="{68B23177-4389-2541-A17C-618151CA109D}" type="presOf" srcId="{58BB93BC-2D58-4C11-9C0A-059125FC4640}" destId="{DF700EFD-AB12-934B-BF04-1557CE80EAD5}" srcOrd="0" destOrd="2" presId="urn:microsoft.com/office/officeart/2005/8/layout/vList2"/>
+    <dgm:cxn modelId="{C970E781-3605-1D48-A4F6-70F76445912B}" type="presOf" srcId="{988D6703-9E6C-45E0-BA07-57F456B5B991}" destId="{DF700EFD-AB12-934B-BF04-1557CE80EAD5}" srcOrd="0" destOrd="3" presId="urn:microsoft.com/office/officeart/2005/8/layout/vList2"/>
+    <dgm:cxn modelId="{F92A728F-757E-428F-AFDF-F2A196A8E5A4}" srcId="{A9CE11E1-9893-4DE8-99B4-FB57BD3F6257}" destId="{D26151A0-A1A9-47FA-8DBD-2739FB3E61B6}" srcOrd="5" destOrd="0" parTransId="{E9BE9F33-8F4A-44FC-BC0C-3B213313CB0D}" sibTransId="{BE6F3B6C-FAD3-4EF3-BE01-2FECD9EDD620}"/>
+    <dgm:cxn modelId="{63C88BA3-3F94-B94C-B330-7AA61402AE3D}" type="presOf" srcId="{D26151A0-A1A9-47FA-8DBD-2739FB3E61B6}" destId="{DF700EFD-AB12-934B-BF04-1557CE80EAD5}" srcOrd="0" destOrd="5" presId="urn:microsoft.com/office/officeart/2005/8/layout/vList2"/>
+    <dgm:cxn modelId="{78C221BD-96BB-0B44-960D-9C7D10B8D04C}" type="presOf" srcId="{25A0D056-009E-46E4-AE6A-C8CD80DF32B8}" destId="{DF700EFD-AB12-934B-BF04-1557CE80EAD5}" srcOrd="0" destOrd="4" presId="urn:microsoft.com/office/officeart/2005/8/layout/vList2"/>
+    <dgm:cxn modelId="{A7CBCBCB-77BE-4FF3-976B-42A4B26237EE}" srcId="{A9CE11E1-9893-4DE8-99B4-FB57BD3F6257}" destId="{0D4AB28C-20B8-4C35-8DFA-C1D183172433}" srcOrd="1" destOrd="0" parTransId="{D6975C15-8176-4573-B243-882BA5BECC8B}" sibTransId="{CA922DFE-629B-40E3-91F4-33B9E429DDE7}"/>
     <dgm:cxn modelId="{59C382CF-81F9-A346-A1EF-C74DF55E22DE}" type="presOf" srcId="{8974E1F8-F66B-4EE7-92BF-A43CB81234ED}" destId="{DF700EFD-AB12-934B-BF04-1557CE80EAD5}" srcOrd="0" destOrd="0" presId="urn:microsoft.com/office/officeart/2005/8/layout/vList2"/>
     <dgm:cxn modelId="{DF9CD9E2-A0FF-7F43-ABFB-04F52DBDE796}" type="presOf" srcId="{A9CE11E1-9893-4DE8-99B4-FB57BD3F6257}" destId="{01F1D247-D3A1-684E-96D6-CB84D00B3AE3}" srcOrd="0" destOrd="0" presId="urn:microsoft.com/office/officeart/2005/8/layout/vList2"/>
     <dgm:cxn modelId="{D384DBE7-9D8A-4911-AA09-3CEA51E420A4}" srcId="{32E1119A-228F-48E4-97C8-711670653FBA}" destId="{A9CE11E1-9893-4DE8-99B4-FB57BD3F6257}" srcOrd="0" destOrd="0" parTransId="{4AA05B65-2678-47D1-BA2F-ECD5C4E71AE5}" sibTransId="{44578067-140E-4CEC-B88E-4629D689D502}"/>
@@ -13658,8 +13885,8 @@
         <a:lstStyle/>
         <a:p>
           <a:r>
-            <a:rPr lang="en-US"/>
-            <a:t>Random Forest performs best</a:t>
+            <a:rPr lang="en-US" dirty="0"/>
+            <a:t>Logistic Regression performs best both before and after Tuning</a:t>
           </a:r>
         </a:p>
       </dgm:t>
@@ -13694,8 +13921,8 @@
         <a:lstStyle/>
         <a:p>
           <a:r>
-            <a:rPr lang="en-US"/>
-            <a:t>High recall + strong generalization</a:t>
+            <a:rPr lang="en-US" dirty="0"/>
+            <a:t>Logistic Regression has got High recall + strong generalization both before and after Tuning</a:t>
           </a:r>
         </a:p>
       </dgm:t>
@@ -13730,8 +13957,8 @@
         <a:lstStyle/>
         <a:p>
           <a:r>
-            <a:rPr lang="en-US"/>
-            <a:t>Balanced precision–recall</a:t>
+            <a:rPr lang="en-US" dirty="0"/>
+            <a:t>Balanced precision–recall both before and after Tuning</a:t>
           </a:r>
         </a:p>
       </dgm:t>
@@ -14225,10 +14452,10 @@
     </dgm:pt>
   </dgm:ptLst>
   <dgm:cxnLst>
+    <dgm:cxn modelId="{7658785D-6DA8-A14F-B135-100141BCFC93}" type="presOf" srcId="{86ED9C70-BB90-4D4D-98FB-99C559E7B934}" destId="{D075E7AE-7FC6-6449-AE93-C8BB2AB85BB7}" srcOrd="0" destOrd="0" presId="urn:microsoft.com/office/officeart/2005/8/layout/vList2"/>
     <dgm:cxn modelId="{CABA5749-27B5-439E-BB37-0829D37DB1A1}" srcId="{F268A553-2653-4E18-9609-3A54D452CB6C}" destId="{D66CA5B1-0CCB-4660-AF83-43EBA8E2FC60}" srcOrd="0" destOrd="0" parTransId="{AA4356CC-3578-46A7-9914-F7C26BFD3D95}" sibTransId="{5C9CA5FB-73E1-4659-8739-D9C1D590740D}"/>
+    <dgm:cxn modelId="{9FB78E76-9894-E34B-839A-39B2D5E703B8}" type="presOf" srcId="{02AD56EF-15F8-4D78-96C9-1D21EB2875ED}" destId="{299FA3BB-E324-3E45-BE2E-7AE45CECBE10}" srcOrd="0" destOrd="0" presId="urn:microsoft.com/office/officeart/2005/8/layout/vList2"/>
     <dgm:cxn modelId="{997D3D57-76C6-D04A-B9A6-0744F0961019}" type="presOf" srcId="{0567AFF7-C0F7-435E-9BC9-130EF453A157}" destId="{E03E5425-6B76-4044-8008-47D529D24114}" srcOrd="0" destOrd="0" presId="urn:microsoft.com/office/officeart/2005/8/layout/vList2"/>
-    <dgm:cxn modelId="{7658785D-6DA8-A14F-B135-100141BCFC93}" type="presOf" srcId="{86ED9C70-BB90-4D4D-98FB-99C559E7B934}" destId="{D075E7AE-7FC6-6449-AE93-C8BB2AB85BB7}" srcOrd="0" destOrd="0" presId="urn:microsoft.com/office/officeart/2005/8/layout/vList2"/>
-    <dgm:cxn modelId="{9FB78E76-9894-E34B-839A-39B2D5E703B8}" type="presOf" srcId="{02AD56EF-15F8-4D78-96C9-1D21EB2875ED}" destId="{299FA3BB-E324-3E45-BE2E-7AE45CECBE10}" srcOrd="0" destOrd="0" presId="urn:microsoft.com/office/officeart/2005/8/layout/vList2"/>
     <dgm:cxn modelId="{55CCE29A-9B94-9841-9CF5-A88FCDF7E3F9}" type="presOf" srcId="{F268A553-2653-4E18-9609-3A54D452CB6C}" destId="{FAB88AD0-81A0-414C-ABB1-08277C563EB8}" srcOrd="0" destOrd="0" presId="urn:microsoft.com/office/officeart/2005/8/layout/vList2"/>
     <dgm:cxn modelId="{CB9E2AA2-1135-40BD-99F5-AA0051C00EE0}" srcId="{F268A553-2653-4E18-9609-3A54D452CB6C}" destId="{86ED9C70-BB90-4D4D-98FB-99C559E7B934}" srcOrd="4" destOrd="0" parTransId="{1A5C30C2-32E3-4D5F-B2CA-186D0B8F466E}" sibTransId="{C932A7B6-ADFE-45E3-9871-12D1AA72D715}"/>
     <dgm:cxn modelId="{C3BDEBA9-92C8-49FC-A95F-62550FA59BD4}" srcId="{F268A553-2653-4E18-9609-3A54D452CB6C}" destId="{02AD56EF-15F8-4D78-96C9-1D21EB2875ED}" srcOrd="1" destOrd="0" parTransId="{C56402D3-7A9A-46AC-99F3-27C9076C6CF7}" sibTransId="{0624E06F-AE1A-4AAD-8BA9-4894352836DB}"/>
@@ -14810,12 +15037,12 @@
         <a:fontRef idx="minor"/>
       </dsp:style>
       <dsp:txBody>
-        <a:bodyPr spcFirstLastPara="0" vert="horz" wrap="square" lIns="198120" tIns="198120" rIns="198120" bIns="198120" numCol="1" spcCol="1270" anchor="t" anchorCtr="0">
+        <a:bodyPr spcFirstLastPara="0" vert="horz" wrap="square" lIns="121920" tIns="121920" rIns="121920" bIns="121920" numCol="1" spcCol="1270" anchor="t" anchorCtr="0">
           <a:noAutofit/>
         </a:bodyPr>
         <a:lstStyle/>
         <a:p>
-          <a:pPr marL="0" lvl="0" indent="0" algn="l" defTabSz="2311400">
+          <a:pPr marL="0" lvl="0" indent="0" algn="l" defTabSz="1422400">
             <a:lnSpc>
               <a:spcPct val="90000"/>
             </a:lnSpc>
@@ -14828,8 +15055,8 @@
             <a:buNone/>
           </a:pPr>
           <a:r>
-            <a:rPr lang="en-US" sz="5200" kern="1200"/>
-            <a:t>• Trees capture non‑linear patterns</a:t>
+            <a:rPr lang="en-US" sz="3200" kern="1200" dirty="0"/>
+            <a:t>• Decision Trees can capture non‑linear patterns but required tuning to achieve good performance.</a:t>
           </a:r>
         </a:p>
       </dsp:txBody>
@@ -14919,12 +15146,12 @@
         <a:fontRef idx="minor"/>
       </dsp:style>
       <dsp:txBody>
-        <a:bodyPr spcFirstLastPara="0" vert="horz" wrap="square" lIns="198120" tIns="198120" rIns="198120" bIns="198120" numCol="1" spcCol="1270" anchor="t" anchorCtr="0">
+        <a:bodyPr spcFirstLastPara="0" vert="horz" wrap="square" lIns="110490" tIns="110490" rIns="110490" bIns="110490" numCol="1" spcCol="1270" anchor="t" anchorCtr="0">
           <a:noAutofit/>
         </a:bodyPr>
         <a:lstStyle/>
         <a:p>
-          <a:pPr marL="0" lvl="0" indent="0" algn="l" defTabSz="2311400">
+          <a:pPr marL="0" lvl="0" indent="0" algn="l" defTabSz="1289050">
             <a:lnSpc>
               <a:spcPct val="90000"/>
             </a:lnSpc>
@@ -14937,8 +15164,8 @@
             <a:buNone/>
           </a:pPr>
           <a:r>
-            <a:rPr lang="en-US" sz="5200" kern="1200"/>
-            <a:t>• Random Forest reduces overfitting</a:t>
+            <a:rPr lang="en-US" sz="2900" kern="1200" dirty="0"/>
+            <a:t>• Random Forest reduces overfitting, showed strong generalization and after tuning achieved one of the best-balanced performance.</a:t>
           </a:r>
         </a:p>
       </dsp:txBody>
@@ -15028,12 +15255,12 @@
         <a:fontRef idx="minor"/>
       </dsp:style>
       <dsp:txBody>
-        <a:bodyPr spcFirstLastPara="0" vert="horz" wrap="square" lIns="198120" tIns="198120" rIns="198120" bIns="198120" numCol="1" spcCol="1270" anchor="t" anchorCtr="0">
+        <a:bodyPr spcFirstLastPara="0" vert="horz" wrap="square" lIns="110490" tIns="110490" rIns="110490" bIns="110490" numCol="1" spcCol="1270" anchor="t" anchorCtr="0">
           <a:noAutofit/>
         </a:bodyPr>
         <a:lstStyle/>
         <a:p>
-          <a:pPr marL="0" lvl="0" indent="0" algn="l" defTabSz="2311400">
+          <a:pPr marL="0" lvl="0" indent="0" algn="l" defTabSz="1289050">
             <a:lnSpc>
               <a:spcPct val="90000"/>
             </a:lnSpc>
@@ -15046,8 +15273,8 @@
             <a:buNone/>
           </a:pPr>
           <a:r>
-            <a:rPr lang="en-US" sz="5200" kern="1200"/>
-            <a:t>• SVM precise but lower recall</a:t>
+            <a:rPr lang="en-US" sz="2900" kern="1200" dirty="0"/>
+            <a:t>• SVM provided good precision but lower recall compared to top performing models which means it was more conservative in identifying churners.</a:t>
           </a:r>
         </a:p>
       </dsp:txBody>
@@ -16041,7 +16268,7 @@
         <a:prstGeom prst="rect">
           <a:avLst/>
         </a:prstGeom>
-        <a:blipFill>
+        <a:blipFill rotWithShape="1">
           <a:blip xmlns:r="http://schemas.openxmlformats.org/officeDocument/2006/relationships" r:embed="rId1">
             <a:extLst>
               <a:ext uri="{28A0092B-C50C-407E-A947-70E740481C1C}">
@@ -16052,6 +16279,7 @@
               </a:ext>
             </a:extLst>
           </a:blip>
+          <a:srcRect/>
           <a:stretch>
             <a:fillRect/>
           </a:stretch>
@@ -16121,7 +16349,7 @@
         </a:bodyPr>
         <a:lstStyle/>
         <a:p>
-          <a:pPr marL="0" lvl="0" indent="0" algn="l" defTabSz="1111250">
+          <a:pPr marL="0" lvl="0" indent="0" algn="l" defTabSz="977900">
             <a:lnSpc>
               <a:spcPct val="100000"/>
             </a:lnSpc>
@@ -16134,7 +16362,7 @@
             <a:buNone/>
           </a:pPr>
           <a:r>
-            <a:rPr lang="en-US" sz="2500" kern="1200"/>
+            <a:rPr lang="en-US" sz="2200" kern="1200"/>
             <a:t>• End‑to‑end churn pipeline built</a:t>
           </a:r>
         </a:p>
@@ -16199,17 +16427,9 @@
         <a:prstGeom prst="rect">
           <a:avLst/>
         </a:prstGeom>
-        <a:blipFill>
-          <a:blip xmlns:r="http://schemas.openxmlformats.org/officeDocument/2006/relationships" r:embed="rId3">
-            <a:extLst>
-              <a:ext uri="{28A0092B-C50C-407E-A947-70E740481C1C}">
-                <a14:useLocalDpi xmlns:a14="http://schemas.microsoft.com/office/drawing/2010/main" val="0"/>
-              </a:ext>
-              <a:ext uri="{96DAC541-7B7A-43D3-8B79-37D633B846F1}">
-                <asvg:svgBlip xmlns:asvg="http://schemas.microsoft.com/office/drawing/2016/SVG/main" r:embed="rId4"/>
-              </a:ext>
-            </a:extLst>
-          </a:blip>
+        <a:blipFill rotWithShape="1">
+          <a:blip xmlns:r="http://schemas.openxmlformats.org/officeDocument/2006/relationships" r:embed="rId3"/>
+          <a:srcRect/>
           <a:stretch>
             <a:fillRect/>
           </a:stretch>
@@ -16279,7 +16499,7 @@
         </a:bodyPr>
         <a:lstStyle/>
         <a:p>
-          <a:pPr marL="0" lvl="0" indent="0" algn="l" defTabSz="1111250">
+          <a:pPr marL="0" lvl="0" indent="0" algn="l" defTabSz="977900">
             <a:lnSpc>
               <a:spcPct val="100000"/>
             </a:lnSpc>
@@ -16292,8 +16512,8 @@
             <a:buNone/>
           </a:pPr>
           <a:r>
-            <a:rPr lang="en-US" sz="2500" kern="1200"/>
-            <a:t>• Random Forest is best overall</a:t>
+            <a:rPr lang="en-US" sz="2200" kern="1200" dirty="0"/>
+            <a:t>• Practical for real retention systems</a:t>
           </a:r>
         </a:p>
       </dsp:txBody>
@@ -16357,17 +16577,9 @@
         <a:prstGeom prst="rect">
           <a:avLst/>
         </a:prstGeom>
-        <a:blipFill>
-          <a:blip xmlns:r="http://schemas.openxmlformats.org/officeDocument/2006/relationships" r:embed="rId5">
-            <a:extLst>
-              <a:ext uri="{28A0092B-C50C-407E-A947-70E740481C1C}">
-                <a14:useLocalDpi xmlns:a14="http://schemas.microsoft.com/office/drawing/2010/main" val="0"/>
-              </a:ext>
-              <a:ext uri="{96DAC541-7B7A-43D3-8B79-37D633B846F1}">
-                <asvg:svgBlip xmlns:asvg="http://schemas.microsoft.com/office/drawing/2016/SVG/main" r:embed="rId6"/>
-              </a:ext>
-            </a:extLst>
-          </a:blip>
+        <a:blipFill rotWithShape="1">
+          <a:blip xmlns:r="http://schemas.openxmlformats.org/officeDocument/2006/relationships" r:embed="rId4"/>
+          <a:srcRect/>
           <a:stretch>
             <a:fillRect/>
           </a:stretch>
@@ -16437,7 +16649,7 @@
         </a:bodyPr>
         <a:lstStyle/>
         <a:p>
-          <a:pPr marL="0" lvl="0" indent="0" algn="l" defTabSz="1111250">
+          <a:pPr marL="0" lvl="0" indent="0" algn="l" defTabSz="977900">
             <a:lnSpc>
               <a:spcPct val="100000"/>
             </a:lnSpc>
@@ -16450,8 +16662,8 @@
             <a:buNone/>
           </a:pPr>
           <a:r>
-            <a:rPr lang="en-US" sz="2500" kern="1200"/>
-            <a:t>• Practical for real retention systems</a:t>
+            <a:rPr lang="en-US" sz="2200" kern="1200" dirty="0"/>
+            <a:t>• Logistic Regression is the best overall providing the strongest &amp; most generalization performance, high AUC, and a well-balanced precision-recall tradeoff both before and after hyperparameter tuning.</a:t>
           </a:r>
         </a:p>
       </dsp:txBody>
@@ -16472,15 +16684,15 @@
       <dsp:cNvGrpSpPr/>
     </dsp:nvGrpSpPr>
     <dsp:grpSpPr/>
-    <dsp:sp modelId="{2179E7BB-5544-AA45-89A4-77EE9A2D4A38}">
+    <dsp:sp modelId="{08DA8AE2-FD40-4AFF-B0B6-DFBDF8B91469}">
       <dsp:nvSpPr>
         <dsp:cNvPr id="0" name=""/>
         <dsp:cNvSpPr/>
       </dsp:nvSpPr>
       <dsp:spPr>
         <a:xfrm>
-          <a:off x="0" y="4634152"/>
-          <a:ext cx="1699418" cy="1013839"/>
+          <a:off x="0" y="5270622"/>
+          <a:ext cx="1762958" cy="691766"/>
         </a:xfrm>
         <a:prstGeom prst="rect">
           <a:avLst/>
@@ -16521,12 +16733,12 @@
         </a:fontRef>
       </dsp:style>
       <dsp:txBody>
-        <a:bodyPr spcFirstLastPara="0" vert="horz" wrap="square" lIns="120863" tIns="220472" rIns="120863" bIns="220472" numCol="1" spcCol="1270" anchor="ctr" anchorCtr="0">
+        <a:bodyPr spcFirstLastPara="0" vert="horz" wrap="square" lIns="125382" tIns="142240" rIns="125382" bIns="142240" numCol="1" spcCol="1270" anchor="ctr" anchorCtr="0">
           <a:noAutofit/>
         </a:bodyPr>
         <a:lstStyle/>
         <a:p>
-          <a:pPr marL="0" lvl="0" indent="0" algn="ctr" defTabSz="1377950">
+          <a:pPr marL="0" lvl="0" indent="0" algn="ctr" defTabSz="889000">
             <a:lnSpc>
               <a:spcPct val="90000"/>
             </a:lnSpc>
@@ -16539,25 +16751,26 @@
             <a:buNone/>
           </a:pPr>
           <a:r>
-            <a:rPr lang="en-US" sz="3100" kern="1200"/>
-            <a:t>Evaluate</a:t>
+            <a:rPr lang="en-US" sz="2000" kern="1200"/>
+            <a:t>Result Comparison</a:t>
           </a:r>
+          <a:endParaRPr lang="en-US" sz="2000" kern="1200" dirty="0"/>
         </a:p>
       </dsp:txBody>
       <dsp:txXfrm>
-        <a:off x="0" y="4634152"/>
-        <a:ext cx="1699418" cy="1013839"/>
+        <a:off x="0" y="5270622"/>
+        <a:ext cx="1762958" cy="691766"/>
       </dsp:txXfrm>
     </dsp:sp>
-    <dsp:sp modelId="{ED4C37FD-E652-5347-B245-F9D2404C50FB}">
+    <dsp:sp modelId="{192BFB00-CDC3-49D8-A0F1-006005A2CA20}">
       <dsp:nvSpPr>
         <dsp:cNvPr id="0" name=""/>
         <dsp:cNvSpPr/>
       </dsp:nvSpPr>
       <dsp:spPr>
         <a:xfrm>
-          <a:off x="1699418" y="4634152"/>
-          <a:ext cx="5098256" cy="1013839"/>
+          <a:off x="1762957" y="5270622"/>
+          <a:ext cx="5288874" cy="691766"/>
         </a:xfrm>
         <a:prstGeom prst="rect">
           <a:avLst/>
@@ -16600,12 +16813,12 @@
         <a:fontRef idx="minor"/>
       </dsp:style>
       <dsp:txBody>
-        <a:bodyPr spcFirstLastPara="0" vert="horz" wrap="square" lIns="103417" tIns="279400" rIns="103417" bIns="279400" numCol="1" spcCol="1270" anchor="ctr" anchorCtr="0">
+        <a:bodyPr spcFirstLastPara="0" vert="horz" wrap="square" lIns="107283" tIns="254000" rIns="107283" bIns="254000" numCol="1" spcCol="1270" anchor="ctr" anchorCtr="0">
           <a:noAutofit/>
         </a:bodyPr>
         <a:lstStyle/>
         <a:p>
-          <a:pPr marL="0" lvl="0" indent="0" algn="l" defTabSz="977900">
+          <a:pPr marL="0" lvl="0" indent="0" algn="l" defTabSz="889000">
             <a:lnSpc>
               <a:spcPct val="90000"/>
             </a:lnSpc>
@@ -16618,25 +16831,26 @@
             <a:buNone/>
           </a:pPr>
           <a:r>
-            <a:rPr lang="en-US" sz="2200" kern="1200"/>
-            <a:t>Evaluate using ROC, F1, confusion matrices</a:t>
+            <a:rPr lang="en-US" sz="2000" kern="1200"/>
+            <a:t>Compare the results obtained before and after tuning</a:t>
           </a:r>
+          <a:endParaRPr lang="en-US" sz="2000" kern="1200" dirty="0"/>
         </a:p>
       </dsp:txBody>
       <dsp:txXfrm>
-        <a:off x="1699418" y="4634152"/>
-        <a:ext cx="5098256" cy="1013839"/>
+        <a:off x="1762957" y="5270622"/>
+        <a:ext cx="5288874" cy="691766"/>
       </dsp:txXfrm>
     </dsp:sp>
-    <dsp:sp modelId="{6F1816EA-C042-AC46-B05B-47202C60DE32}">
+    <dsp:sp modelId="{478A46B8-D9DF-4AA6-8F34-92BA0C18D709}">
       <dsp:nvSpPr>
         <dsp:cNvPr id="0" name=""/>
         <dsp:cNvSpPr/>
       </dsp:nvSpPr>
       <dsp:spPr>
         <a:xfrm rot="10800000">
-          <a:off x="0" y="3090074"/>
-          <a:ext cx="1699418" cy="1559284"/>
+          <a:off x="0" y="4217061"/>
+          <a:ext cx="1762958" cy="1063936"/>
         </a:xfrm>
         <a:prstGeom prst="upArrowCallout">
           <a:avLst>
@@ -16648,18 +16862,18 @@
         </a:prstGeom>
         <a:solidFill>
           <a:schemeClr val="accent2">
-            <a:hueOff val="-441124"/>
-            <a:satOff val="497"/>
-            <a:lumOff val="1177"/>
+            <a:hueOff val="-264675"/>
+            <a:satOff val="298"/>
+            <a:lumOff val="706"/>
             <a:alphaOff val="0"/>
           </a:schemeClr>
         </a:solidFill>
         <a:ln w="15875" cap="flat" cmpd="sng" algn="ctr">
           <a:solidFill>
             <a:schemeClr val="accent2">
-              <a:hueOff val="-441124"/>
-              <a:satOff val="497"/>
-              <a:lumOff val="1177"/>
+              <a:hueOff val="-264675"/>
+              <a:satOff val="298"/>
+              <a:lumOff val="706"/>
               <a:alphaOff val="0"/>
             </a:schemeClr>
           </a:solidFill>
@@ -16682,12 +16896,12 @@
         </a:fontRef>
       </dsp:style>
       <dsp:txBody>
-        <a:bodyPr spcFirstLastPara="0" vert="horz" wrap="square" lIns="120863" tIns="220472" rIns="120863" bIns="220472" numCol="1" spcCol="1270" anchor="ctr" anchorCtr="0">
+        <a:bodyPr spcFirstLastPara="0" vert="horz" wrap="square" lIns="125382" tIns="142240" rIns="125382" bIns="142240" numCol="1" spcCol="1270" anchor="ctr" anchorCtr="0">
           <a:noAutofit/>
         </a:bodyPr>
         <a:lstStyle/>
         <a:p>
-          <a:pPr marL="0" lvl="0" indent="0" algn="ctr" defTabSz="1377950">
+          <a:pPr marL="0" lvl="0" indent="0" algn="ctr" defTabSz="889000">
             <a:lnSpc>
               <a:spcPct val="90000"/>
             </a:lnSpc>
@@ -16700,25 +16914,25 @@
             <a:buNone/>
           </a:pPr>
           <a:r>
-            <a:rPr lang="en-US" sz="3100" kern="1200"/>
-            <a:t>Identify</a:t>
+            <a:rPr lang="en-US" sz="2000" kern="1200" dirty="0"/>
+            <a:t>Model Tuning</a:t>
           </a:r>
         </a:p>
       </dsp:txBody>
       <dsp:txXfrm rot="-10800000">
-        <a:off x="0" y="3090074"/>
-        <a:ext cx="1699418" cy="1013535"/>
+        <a:off x="0" y="4217061"/>
+        <a:ext cx="1762958" cy="691558"/>
       </dsp:txXfrm>
     </dsp:sp>
-    <dsp:sp modelId="{16ADB738-2B7D-BB49-B253-8C697AC25402}">
+    <dsp:sp modelId="{A64E94A7-3257-4A22-BF68-E6378EB15A1C}">
       <dsp:nvSpPr>
         <dsp:cNvPr id="0" name=""/>
         <dsp:cNvSpPr/>
       </dsp:nvSpPr>
       <dsp:spPr>
         <a:xfrm>
-          <a:off x="1699418" y="3090074"/>
-          <a:ext cx="5098256" cy="1013535"/>
+          <a:off x="1762957" y="4217061"/>
+          <a:ext cx="5288874" cy="691558"/>
         </a:xfrm>
         <a:prstGeom prst="rect">
           <a:avLst/>
@@ -16727,9 +16941,9 @@
           <a:schemeClr val="accent2">
             <a:tint val="40000"/>
             <a:alpha val="90000"/>
-            <a:hueOff val="-613955"/>
-            <a:satOff val="4090"/>
-            <a:lumOff val="374"/>
+            <a:hueOff val="-368373"/>
+            <a:satOff val="2454"/>
+            <a:lumOff val="224"/>
             <a:alphaOff val="0"/>
           </a:schemeClr>
         </a:solidFill>
@@ -16738,9 +16952,9 @@
             <a:schemeClr val="accent2">
               <a:tint val="40000"/>
               <a:alpha val="90000"/>
-              <a:hueOff val="-613955"/>
-              <a:satOff val="4090"/>
-              <a:lumOff val="374"/>
+              <a:hueOff val="-368373"/>
+              <a:satOff val="2454"/>
+              <a:lumOff val="224"/>
               <a:alphaOff val="0"/>
             </a:schemeClr>
           </a:solidFill>
@@ -16761,12 +16975,12 @@
         <a:fontRef idx="minor"/>
       </dsp:style>
       <dsp:txBody>
-        <a:bodyPr spcFirstLastPara="0" vert="horz" wrap="square" lIns="103417" tIns="279400" rIns="103417" bIns="279400" numCol="1" spcCol="1270" anchor="ctr" anchorCtr="0">
+        <a:bodyPr spcFirstLastPara="0" vert="horz" wrap="square" lIns="107283" tIns="254000" rIns="107283" bIns="254000" numCol="1" spcCol="1270" anchor="ctr" anchorCtr="0">
           <a:noAutofit/>
         </a:bodyPr>
         <a:lstStyle/>
         <a:p>
-          <a:pPr marL="0" lvl="0" indent="0" algn="l" defTabSz="977900">
+          <a:pPr marL="0" lvl="0" indent="0" algn="l" defTabSz="889000">
             <a:lnSpc>
               <a:spcPct val="90000"/>
             </a:lnSpc>
@@ -16779,25 +16993,25 @@
             <a:buNone/>
           </a:pPr>
           <a:r>
-            <a:rPr lang="en-US" sz="2200" kern="1200"/>
-            <a:t>Identify key churn drivers</a:t>
+            <a:rPr lang="en-US" sz="2000" kern="1200" dirty="0"/>
+            <a:t>Perform Hyperparameter Tuning and Re-evaluate the models</a:t>
           </a:r>
         </a:p>
       </dsp:txBody>
       <dsp:txXfrm>
-        <a:off x="1699418" y="3090074"/>
-        <a:ext cx="5098256" cy="1013535"/>
+        <a:off x="1762957" y="4217061"/>
+        <a:ext cx="5288874" cy="691558"/>
       </dsp:txXfrm>
     </dsp:sp>
-    <dsp:sp modelId="{2C98E024-EA30-4940-86BB-1786E33B3386}">
+    <dsp:sp modelId="{71D90824-5929-4253-9DD4-B45EFFB3F875}">
       <dsp:nvSpPr>
         <dsp:cNvPr id="0" name=""/>
         <dsp:cNvSpPr/>
       </dsp:nvSpPr>
       <dsp:spPr>
         <a:xfrm rot="10800000">
-          <a:off x="0" y="1545997"/>
-          <a:ext cx="1699418" cy="1559284"/>
+          <a:off x="0" y="3163501"/>
+          <a:ext cx="1762958" cy="1063936"/>
         </a:xfrm>
         <a:prstGeom prst="upArrowCallout">
           <a:avLst>
@@ -16809,18 +17023,18 @@
         </a:prstGeom>
         <a:solidFill>
           <a:schemeClr val="accent2">
-            <a:hueOff val="-882249"/>
-            <a:satOff val="995"/>
-            <a:lumOff val="2353"/>
+            <a:hueOff val="-529349"/>
+            <a:satOff val="597"/>
+            <a:lumOff val="1412"/>
             <a:alphaOff val="0"/>
           </a:schemeClr>
         </a:solidFill>
         <a:ln w="15875" cap="flat" cmpd="sng" algn="ctr">
           <a:solidFill>
             <a:schemeClr val="accent2">
-              <a:hueOff val="-882249"/>
-              <a:satOff val="995"/>
-              <a:lumOff val="2353"/>
+              <a:hueOff val="-529349"/>
+              <a:satOff val="597"/>
+              <a:lumOff val="1412"/>
               <a:alphaOff val="0"/>
             </a:schemeClr>
           </a:solidFill>
@@ -16843,12 +17057,12 @@
         </a:fontRef>
       </dsp:style>
       <dsp:txBody>
-        <a:bodyPr spcFirstLastPara="0" vert="horz" wrap="square" lIns="120863" tIns="220472" rIns="120863" bIns="220472" numCol="1" spcCol="1270" anchor="ctr" anchorCtr="0">
+        <a:bodyPr spcFirstLastPara="0" vert="horz" wrap="square" lIns="125382" tIns="199136" rIns="125382" bIns="199136" numCol="1" spcCol="1270" anchor="ctr" anchorCtr="0">
           <a:noAutofit/>
         </a:bodyPr>
         <a:lstStyle/>
         <a:p>
-          <a:pPr marL="0" lvl="0" indent="0" algn="ctr" defTabSz="1377950">
+          <a:pPr marL="0" lvl="0" indent="0" algn="ctr" defTabSz="1244600">
             <a:lnSpc>
               <a:spcPct val="90000"/>
             </a:lnSpc>
@@ -16861,25 +17075,25 @@
             <a:buNone/>
           </a:pPr>
           <a:r>
-            <a:rPr lang="en-US" sz="3100" kern="1200"/>
-            <a:t>Compare</a:t>
+            <a:rPr lang="en-US" sz="2800" kern="1200" dirty="0"/>
+            <a:t>Evaluate</a:t>
           </a:r>
         </a:p>
       </dsp:txBody>
       <dsp:txXfrm rot="-10800000">
-        <a:off x="0" y="1545997"/>
-        <a:ext cx="1699418" cy="1013535"/>
+        <a:off x="0" y="3163501"/>
+        <a:ext cx="1762958" cy="691558"/>
       </dsp:txXfrm>
     </dsp:sp>
-    <dsp:sp modelId="{8B9DBE26-56BB-834B-94FE-F4C0F223A6A9}">
+    <dsp:sp modelId="{CF1C78FE-D127-4DDE-9FE4-78FF94448E8F}">
       <dsp:nvSpPr>
         <dsp:cNvPr id="0" name=""/>
         <dsp:cNvSpPr/>
       </dsp:nvSpPr>
       <dsp:spPr>
         <a:xfrm>
-          <a:off x="1699418" y="1545997"/>
-          <a:ext cx="5098256" cy="1013535"/>
+          <a:off x="1762957" y="3163501"/>
+          <a:ext cx="5288874" cy="691558"/>
         </a:xfrm>
         <a:prstGeom prst="rect">
           <a:avLst/>
@@ -16888,9 +17102,9 @@
           <a:schemeClr val="accent2">
             <a:tint val="40000"/>
             <a:alpha val="90000"/>
-            <a:hueOff val="-1227910"/>
-            <a:satOff val="8180"/>
-            <a:lumOff val="748"/>
+            <a:hueOff val="-736746"/>
+            <a:satOff val="4908"/>
+            <a:lumOff val="449"/>
             <a:alphaOff val="0"/>
           </a:schemeClr>
         </a:solidFill>
@@ -16899,9 +17113,9 @@
             <a:schemeClr val="accent2">
               <a:tint val="40000"/>
               <a:alpha val="90000"/>
-              <a:hueOff val="-1227910"/>
-              <a:satOff val="8180"/>
-              <a:lumOff val="748"/>
+              <a:hueOff val="-736746"/>
+              <a:satOff val="4908"/>
+              <a:lumOff val="449"/>
               <a:alphaOff val="0"/>
             </a:schemeClr>
           </a:solidFill>
@@ -16922,12 +17136,12 @@
         <a:fontRef idx="minor"/>
       </dsp:style>
       <dsp:txBody>
-        <a:bodyPr spcFirstLastPara="0" vert="horz" wrap="square" lIns="103417" tIns="279400" rIns="103417" bIns="279400" numCol="1" spcCol="1270" anchor="ctr" anchorCtr="0">
+        <a:bodyPr spcFirstLastPara="0" vert="horz" wrap="square" lIns="107283" tIns="304800" rIns="107283" bIns="304800" numCol="1" spcCol="1270" anchor="ctr" anchorCtr="0">
           <a:noAutofit/>
         </a:bodyPr>
         <a:lstStyle/>
         <a:p>
-          <a:pPr marL="0" lvl="0" indent="0" algn="l" defTabSz="977900">
+          <a:pPr marL="0" lvl="0" indent="0" algn="l" defTabSz="1066800">
             <a:lnSpc>
               <a:spcPct val="90000"/>
             </a:lnSpc>
@@ -16940,14 +17154,336 @@
             <a:buNone/>
           </a:pPr>
           <a:r>
-            <a:rPr lang="en-US" sz="2200" kern="1200"/>
+            <a:rPr lang="en-US" sz="2400" kern="1200" dirty="0"/>
+            <a:t>Evaluate using ROC, F1, confusion matrices</a:t>
+          </a:r>
+        </a:p>
+      </dsp:txBody>
+      <dsp:txXfrm>
+        <a:off x="1762957" y="3163501"/>
+        <a:ext cx="5288874" cy="691558"/>
+      </dsp:txXfrm>
+    </dsp:sp>
+    <dsp:sp modelId="{6F1816EA-C042-AC46-B05B-47202C60DE32}">
+      <dsp:nvSpPr>
+        <dsp:cNvPr id="0" name=""/>
+        <dsp:cNvSpPr/>
+      </dsp:nvSpPr>
+      <dsp:spPr>
+        <a:xfrm rot="10800000">
+          <a:off x="0" y="2109941"/>
+          <a:ext cx="1762958" cy="1063936"/>
+        </a:xfrm>
+        <a:prstGeom prst="upArrowCallout">
+          <a:avLst>
+            <a:gd name="adj1" fmla="val 5000"/>
+            <a:gd name="adj2" fmla="val 10000"/>
+            <a:gd name="adj3" fmla="val 15000"/>
+            <a:gd name="adj4" fmla="val 64977"/>
+          </a:avLst>
+        </a:prstGeom>
+        <a:solidFill>
+          <a:schemeClr val="accent2">
+            <a:hueOff val="-794024"/>
+            <a:satOff val="895"/>
+            <a:lumOff val="2118"/>
+            <a:alphaOff val="0"/>
+          </a:schemeClr>
+        </a:solidFill>
+        <a:ln w="15875" cap="flat" cmpd="sng" algn="ctr">
+          <a:solidFill>
+            <a:schemeClr val="accent2">
+              <a:hueOff val="-794024"/>
+              <a:satOff val="895"/>
+              <a:lumOff val="2118"/>
+              <a:alphaOff val="0"/>
+            </a:schemeClr>
+          </a:solidFill>
+          <a:prstDash val="solid"/>
+        </a:ln>
+        <a:effectLst/>
+      </dsp:spPr>
+      <dsp:style>
+        <a:lnRef idx="2">
+          <a:scrgbClr r="0" g="0" b="0"/>
+        </a:lnRef>
+        <a:fillRef idx="1">
+          <a:scrgbClr r="0" g="0" b="0"/>
+        </a:fillRef>
+        <a:effectRef idx="0">
+          <a:scrgbClr r="0" g="0" b="0"/>
+        </a:effectRef>
+        <a:fontRef idx="minor">
+          <a:schemeClr val="lt1"/>
+        </a:fontRef>
+      </dsp:style>
+      <dsp:txBody>
+        <a:bodyPr spcFirstLastPara="0" vert="horz" wrap="square" lIns="125382" tIns="199136" rIns="125382" bIns="199136" numCol="1" spcCol="1270" anchor="ctr" anchorCtr="0">
+          <a:noAutofit/>
+        </a:bodyPr>
+        <a:lstStyle/>
+        <a:p>
+          <a:pPr marL="0" lvl="0" indent="0" algn="ctr" defTabSz="1244600">
+            <a:lnSpc>
+              <a:spcPct val="90000"/>
+            </a:lnSpc>
+            <a:spcBef>
+              <a:spcPct val="0"/>
+            </a:spcBef>
+            <a:spcAft>
+              <a:spcPct val="35000"/>
+            </a:spcAft>
+            <a:buNone/>
+          </a:pPr>
+          <a:r>
+            <a:rPr lang="en-US" sz="2800" kern="1200" dirty="0"/>
+            <a:t>Identify</a:t>
+          </a:r>
+        </a:p>
+      </dsp:txBody>
+      <dsp:txXfrm rot="-10800000">
+        <a:off x="0" y="2109941"/>
+        <a:ext cx="1762958" cy="691558"/>
+      </dsp:txXfrm>
+    </dsp:sp>
+    <dsp:sp modelId="{16ADB738-2B7D-BB49-B253-8C697AC25402}">
+      <dsp:nvSpPr>
+        <dsp:cNvPr id="0" name=""/>
+        <dsp:cNvSpPr/>
+      </dsp:nvSpPr>
+      <dsp:spPr>
+        <a:xfrm>
+          <a:off x="1762957" y="2109941"/>
+          <a:ext cx="5288874" cy="691558"/>
+        </a:xfrm>
+        <a:prstGeom prst="rect">
+          <a:avLst/>
+        </a:prstGeom>
+        <a:solidFill>
+          <a:schemeClr val="accent2">
+            <a:tint val="40000"/>
+            <a:alpha val="90000"/>
+            <a:hueOff val="-1105119"/>
+            <a:satOff val="7362"/>
+            <a:lumOff val="673"/>
+            <a:alphaOff val="0"/>
+          </a:schemeClr>
+        </a:solidFill>
+        <a:ln w="15875" cap="flat" cmpd="sng" algn="ctr">
+          <a:solidFill>
+            <a:schemeClr val="accent2">
+              <a:tint val="40000"/>
+              <a:alpha val="90000"/>
+              <a:hueOff val="-1105119"/>
+              <a:satOff val="7362"/>
+              <a:lumOff val="673"/>
+              <a:alphaOff val="0"/>
+            </a:schemeClr>
+          </a:solidFill>
+          <a:prstDash val="solid"/>
+        </a:ln>
+        <a:effectLst/>
+      </dsp:spPr>
+      <dsp:style>
+        <a:lnRef idx="2">
+          <a:scrgbClr r="0" g="0" b="0"/>
+        </a:lnRef>
+        <a:fillRef idx="1">
+          <a:scrgbClr r="0" g="0" b="0"/>
+        </a:fillRef>
+        <a:effectRef idx="0">
+          <a:scrgbClr r="0" g="0" b="0"/>
+        </a:effectRef>
+        <a:fontRef idx="minor"/>
+      </dsp:style>
+      <dsp:txBody>
+        <a:bodyPr spcFirstLastPara="0" vert="horz" wrap="square" lIns="107283" tIns="304800" rIns="107283" bIns="304800" numCol="1" spcCol="1270" anchor="ctr" anchorCtr="0">
+          <a:noAutofit/>
+        </a:bodyPr>
+        <a:lstStyle/>
+        <a:p>
+          <a:pPr marL="0" lvl="0" indent="0" algn="l" defTabSz="1066800">
+            <a:lnSpc>
+              <a:spcPct val="90000"/>
+            </a:lnSpc>
+            <a:spcBef>
+              <a:spcPct val="0"/>
+            </a:spcBef>
+            <a:spcAft>
+              <a:spcPct val="35000"/>
+            </a:spcAft>
+            <a:buNone/>
+          </a:pPr>
+          <a:r>
+            <a:rPr lang="en-US" sz="2400" kern="1200" dirty="0"/>
+            <a:t>Identify key churn drivers</a:t>
+          </a:r>
+        </a:p>
+      </dsp:txBody>
+      <dsp:txXfrm>
+        <a:off x="1762957" y="2109941"/>
+        <a:ext cx="5288874" cy="691558"/>
+      </dsp:txXfrm>
+    </dsp:sp>
+    <dsp:sp modelId="{2C98E024-EA30-4940-86BB-1786E33B3386}">
+      <dsp:nvSpPr>
+        <dsp:cNvPr id="0" name=""/>
+        <dsp:cNvSpPr/>
+      </dsp:nvSpPr>
+      <dsp:spPr>
+        <a:xfrm rot="10800000">
+          <a:off x="0" y="1056381"/>
+          <a:ext cx="1762958" cy="1063936"/>
+        </a:xfrm>
+        <a:prstGeom prst="upArrowCallout">
+          <a:avLst>
+            <a:gd name="adj1" fmla="val 5000"/>
+            <a:gd name="adj2" fmla="val 10000"/>
+            <a:gd name="adj3" fmla="val 15000"/>
+            <a:gd name="adj4" fmla="val 64977"/>
+          </a:avLst>
+        </a:prstGeom>
+        <a:solidFill>
+          <a:schemeClr val="accent2">
+            <a:hueOff val="-1058698"/>
+            <a:satOff val="1194"/>
+            <a:lumOff val="2824"/>
+            <a:alphaOff val="0"/>
+          </a:schemeClr>
+        </a:solidFill>
+        <a:ln w="15875" cap="flat" cmpd="sng" algn="ctr">
+          <a:solidFill>
+            <a:schemeClr val="accent2">
+              <a:hueOff val="-1058698"/>
+              <a:satOff val="1194"/>
+              <a:lumOff val="2824"/>
+              <a:alphaOff val="0"/>
+            </a:schemeClr>
+          </a:solidFill>
+          <a:prstDash val="solid"/>
+        </a:ln>
+        <a:effectLst/>
+      </dsp:spPr>
+      <dsp:style>
+        <a:lnRef idx="2">
+          <a:scrgbClr r="0" g="0" b="0"/>
+        </a:lnRef>
+        <a:fillRef idx="1">
+          <a:scrgbClr r="0" g="0" b="0"/>
+        </a:fillRef>
+        <a:effectRef idx="0">
+          <a:scrgbClr r="0" g="0" b="0"/>
+        </a:effectRef>
+        <a:fontRef idx="minor">
+          <a:schemeClr val="lt1"/>
+        </a:fontRef>
+      </dsp:style>
+      <dsp:txBody>
+        <a:bodyPr spcFirstLastPara="0" vert="horz" wrap="square" lIns="125382" tIns="199136" rIns="125382" bIns="199136" numCol="1" spcCol="1270" anchor="ctr" anchorCtr="0">
+          <a:noAutofit/>
+        </a:bodyPr>
+        <a:lstStyle/>
+        <a:p>
+          <a:pPr marL="0" lvl="0" indent="0" algn="ctr" defTabSz="1244600">
+            <a:lnSpc>
+              <a:spcPct val="90000"/>
+            </a:lnSpc>
+            <a:spcBef>
+              <a:spcPct val="0"/>
+            </a:spcBef>
+            <a:spcAft>
+              <a:spcPct val="35000"/>
+            </a:spcAft>
+            <a:buNone/>
+          </a:pPr>
+          <a:r>
+            <a:rPr lang="en-US" sz="2800" kern="1200" dirty="0"/>
+            <a:t>Compare</a:t>
+          </a:r>
+        </a:p>
+      </dsp:txBody>
+      <dsp:txXfrm rot="-10800000">
+        <a:off x="0" y="1056381"/>
+        <a:ext cx="1762958" cy="691558"/>
+      </dsp:txXfrm>
+    </dsp:sp>
+    <dsp:sp modelId="{8B9DBE26-56BB-834B-94FE-F4C0F223A6A9}">
+      <dsp:nvSpPr>
+        <dsp:cNvPr id="0" name=""/>
+        <dsp:cNvSpPr/>
+      </dsp:nvSpPr>
+      <dsp:spPr>
+        <a:xfrm>
+          <a:off x="1762957" y="1056381"/>
+          <a:ext cx="5288874" cy="691558"/>
+        </a:xfrm>
+        <a:prstGeom prst="rect">
+          <a:avLst/>
+        </a:prstGeom>
+        <a:solidFill>
+          <a:schemeClr val="accent2">
+            <a:tint val="40000"/>
+            <a:alpha val="90000"/>
+            <a:hueOff val="-1473492"/>
+            <a:satOff val="9816"/>
+            <a:lumOff val="898"/>
+            <a:alphaOff val="0"/>
+          </a:schemeClr>
+        </a:solidFill>
+        <a:ln w="15875" cap="flat" cmpd="sng" algn="ctr">
+          <a:solidFill>
+            <a:schemeClr val="accent2">
+              <a:tint val="40000"/>
+              <a:alpha val="90000"/>
+              <a:hueOff val="-1473492"/>
+              <a:satOff val="9816"/>
+              <a:lumOff val="898"/>
+              <a:alphaOff val="0"/>
+            </a:schemeClr>
+          </a:solidFill>
+          <a:prstDash val="solid"/>
+        </a:ln>
+        <a:effectLst/>
+      </dsp:spPr>
+      <dsp:style>
+        <a:lnRef idx="2">
+          <a:scrgbClr r="0" g="0" b="0"/>
+        </a:lnRef>
+        <a:fillRef idx="1">
+          <a:scrgbClr r="0" g="0" b="0"/>
+        </a:fillRef>
+        <a:effectRef idx="0">
+          <a:scrgbClr r="0" g="0" b="0"/>
+        </a:effectRef>
+        <a:fontRef idx="minor"/>
+      </dsp:style>
+      <dsp:txBody>
+        <a:bodyPr spcFirstLastPara="0" vert="horz" wrap="square" lIns="107283" tIns="304800" rIns="107283" bIns="304800" numCol="1" spcCol="1270" anchor="ctr" anchorCtr="0">
+          <a:noAutofit/>
+        </a:bodyPr>
+        <a:lstStyle/>
+        <a:p>
+          <a:pPr marL="0" lvl="0" indent="0" algn="l" defTabSz="1066800">
+            <a:lnSpc>
+              <a:spcPct val="90000"/>
+            </a:lnSpc>
+            <a:spcBef>
+              <a:spcPct val="0"/>
+            </a:spcBef>
+            <a:spcAft>
+              <a:spcPct val="35000"/>
+            </a:spcAft>
+            <a:buNone/>
+          </a:pPr>
+          <a:r>
+            <a:rPr lang="en-US" sz="2400" kern="1200" dirty="0"/>
             <a:t>Compare multiple models</a:t>
           </a:r>
         </a:p>
       </dsp:txBody>
       <dsp:txXfrm>
-        <a:off x="1699418" y="1545997"/>
-        <a:ext cx="5098256" cy="1013535"/>
+        <a:off x="1762957" y="1056381"/>
+        <a:ext cx="5288874" cy="691558"/>
       </dsp:txXfrm>
     </dsp:sp>
     <dsp:sp modelId="{29D6F870-D01B-3844-9017-D580A8ED4A41}">
@@ -16957,8 +17493,8 @@
       </dsp:nvSpPr>
       <dsp:spPr>
         <a:xfrm rot="10800000">
-          <a:off x="0" y="1920"/>
-          <a:ext cx="1699418" cy="1559284"/>
+          <a:off x="0" y="2821"/>
+          <a:ext cx="1762958" cy="1063936"/>
         </a:xfrm>
         <a:prstGeom prst="upArrowCallout">
           <a:avLst>
@@ -17004,12 +17540,12 @@
         </a:fontRef>
       </dsp:style>
       <dsp:txBody>
-        <a:bodyPr spcFirstLastPara="0" vert="horz" wrap="square" lIns="120863" tIns="220472" rIns="120863" bIns="220472" numCol="1" spcCol="1270" anchor="ctr" anchorCtr="0">
+        <a:bodyPr spcFirstLastPara="0" vert="horz" wrap="square" lIns="125382" tIns="199136" rIns="125382" bIns="199136" numCol="1" spcCol="1270" anchor="ctr" anchorCtr="0">
           <a:noAutofit/>
         </a:bodyPr>
         <a:lstStyle/>
         <a:p>
-          <a:pPr marL="0" lvl="0" indent="0" algn="ctr" defTabSz="1377950">
+          <a:pPr marL="0" lvl="0" indent="0" algn="ctr" defTabSz="1244600">
             <a:lnSpc>
               <a:spcPct val="90000"/>
             </a:lnSpc>
@@ -17022,14 +17558,15 @@
             <a:buNone/>
           </a:pPr>
           <a:r>
-            <a:rPr lang="en-US" sz="3100" kern="1200"/>
+            <a:rPr lang="en-US" sz="2800" kern="1200" dirty="0"/>
             <a:t>Build</a:t>
           </a:r>
+          <a:endParaRPr lang="en-US" sz="1600" kern="1200" dirty="0"/>
         </a:p>
       </dsp:txBody>
       <dsp:txXfrm rot="-10800000">
-        <a:off x="0" y="1920"/>
-        <a:ext cx="1699418" cy="1013535"/>
+        <a:off x="0" y="2821"/>
+        <a:ext cx="1762958" cy="691558"/>
       </dsp:txXfrm>
     </dsp:sp>
     <dsp:sp modelId="{9C631705-1328-6B4E-8D56-E2DC8365389F}">
@@ -17039,8 +17576,8 @@
       </dsp:nvSpPr>
       <dsp:spPr>
         <a:xfrm>
-          <a:off x="1699418" y="1920"/>
-          <a:ext cx="5098256" cy="1013535"/>
+          <a:off x="1762957" y="2821"/>
+          <a:ext cx="5288874" cy="691558"/>
         </a:xfrm>
         <a:prstGeom prst="rect">
           <a:avLst/>
@@ -17083,12 +17620,12 @@
         <a:fontRef idx="minor"/>
       </dsp:style>
       <dsp:txBody>
-        <a:bodyPr spcFirstLastPara="0" vert="horz" wrap="square" lIns="103417" tIns="279400" rIns="103417" bIns="279400" numCol="1" spcCol="1270" anchor="ctr" anchorCtr="0">
+        <a:bodyPr spcFirstLastPara="0" vert="horz" wrap="square" lIns="107283" tIns="304800" rIns="107283" bIns="304800" numCol="1" spcCol="1270" anchor="ctr" anchorCtr="0">
           <a:noAutofit/>
         </a:bodyPr>
         <a:lstStyle/>
         <a:p>
-          <a:pPr marL="0" lvl="0" indent="0" algn="l" defTabSz="977900">
+          <a:pPr marL="0" lvl="0" indent="0" algn="l" defTabSz="1066800">
             <a:lnSpc>
               <a:spcPct val="90000"/>
             </a:lnSpc>
@@ -17101,14 +17638,14 @@
             <a:buNone/>
           </a:pPr>
           <a:r>
-            <a:rPr lang="en-US" sz="2200" kern="1200"/>
+            <a:rPr lang="en-US" sz="2400" kern="1200" dirty="0"/>
             <a:t>Build reproducible ML pipeline</a:t>
           </a:r>
         </a:p>
       </dsp:txBody>
       <dsp:txXfrm>
-        <a:off x="1699418" y="1920"/>
-        <a:ext cx="5098256" cy="1013535"/>
+        <a:off x="1762957" y="2821"/>
+        <a:ext cx="5288874" cy="691558"/>
       </dsp:txXfrm>
     </dsp:sp>
   </dsp:spTree>
@@ -18390,8 +18927,8 @@
       </dsp:nvSpPr>
       <dsp:spPr>
         <a:xfrm>
-          <a:off x="0" y="2218"/>
-          <a:ext cx="6797675" cy="1319175"/>
+          <a:off x="0" y="5863"/>
+          <a:ext cx="6797675" cy="1175264"/>
         </a:xfrm>
         <a:prstGeom prst="roundRect">
           <a:avLst/>
@@ -18432,12 +18969,12 @@
         </a:fontRef>
       </dsp:style>
       <dsp:txBody>
-        <a:bodyPr spcFirstLastPara="0" vert="horz" wrap="square" lIns="209550" tIns="209550" rIns="209550" bIns="209550" numCol="1" spcCol="1270" anchor="ctr" anchorCtr="0">
+        <a:bodyPr spcFirstLastPara="0" vert="horz" wrap="square" lIns="186690" tIns="186690" rIns="186690" bIns="186690" numCol="1" spcCol="1270" anchor="ctr" anchorCtr="0">
           <a:noAutofit/>
         </a:bodyPr>
         <a:lstStyle/>
         <a:p>
-          <a:pPr marL="0" lvl="0" indent="0" algn="l" defTabSz="2444750">
+          <a:pPr marL="0" lvl="0" indent="0" algn="l" defTabSz="2178050">
             <a:lnSpc>
               <a:spcPct val="90000"/>
             </a:lnSpc>
@@ -18450,15 +18987,15 @@
             <a:buNone/>
           </a:pPr>
           <a:r>
-            <a:rPr lang="en-IN" sz="5500" kern="1200"/>
+            <a:rPr lang="en-IN" sz="4900" kern="1200" dirty="0"/>
             <a:t>Models Used:</a:t>
           </a:r>
-          <a:endParaRPr lang="en-US" sz="5500" kern="1200"/>
+          <a:endParaRPr lang="en-US" sz="4900" kern="1200" dirty="0"/>
         </a:p>
       </dsp:txBody>
       <dsp:txXfrm>
-        <a:off x="64397" y="66615"/>
-        <a:ext cx="6668881" cy="1190381"/>
+        <a:off x="57372" y="63235"/>
+        <a:ext cx="6682931" cy="1060520"/>
       </dsp:txXfrm>
     </dsp:sp>
     <dsp:sp modelId="{DF700EFD-AB12-934B-BF04-1557CE80EAD5}">
@@ -18468,8 +19005,8 @@
       </dsp:nvSpPr>
       <dsp:spPr>
         <a:xfrm>
-          <a:off x="0" y="1321393"/>
-          <a:ext cx="6797675" cy="4326300"/>
+          <a:off x="0" y="1181128"/>
+          <a:ext cx="6797675" cy="4462920"/>
         </a:xfrm>
         <a:prstGeom prst="rect">
           <a:avLst/>
@@ -18493,12 +19030,12 @@
         <a:fontRef idx="minor"/>
       </dsp:style>
       <dsp:txBody>
-        <a:bodyPr spcFirstLastPara="0" vert="horz" wrap="square" lIns="215826" tIns="69850" rIns="391160" bIns="69850" numCol="1" spcCol="1270" anchor="t" anchorCtr="0">
+        <a:bodyPr spcFirstLastPara="0" vert="horz" wrap="square" lIns="215826" tIns="62230" rIns="348488" bIns="62230" numCol="1" spcCol="1270" anchor="t" anchorCtr="0">
           <a:noAutofit/>
         </a:bodyPr>
         <a:lstStyle/>
         <a:p>
-          <a:pPr marL="285750" lvl="1" indent="-285750" algn="l" defTabSz="1911350">
+          <a:pPr marL="285750" lvl="1" indent="-285750" algn="l" defTabSz="1689100">
             <a:lnSpc>
               <a:spcPct val="90000"/>
             </a:lnSpc>
@@ -18511,12 +19048,12 @@
             <a:buChar char="•"/>
           </a:pPr>
           <a:r>
-            <a:rPr lang="en-US" sz="4300" kern="1200"/>
-            <a:t>Logistic Regression</a:t>
+            <a:rPr lang="en-US" sz="3800" kern="1200" dirty="0"/>
+            <a:t>Naïve Bayes</a:t>
           </a:r>
         </a:p>
         <a:p>
-          <a:pPr marL="285750" lvl="1" indent="-285750" algn="l" defTabSz="1911350">
+          <a:pPr marL="285750" lvl="1" indent="-285750" algn="l" defTabSz="1689100">
             <a:lnSpc>
               <a:spcPct val="90000"/>
             </a:lnSpc>
@@ -18529,12 +19066,12 @@
             <a:buChar char="•"/>
           </a:pPr>
           <a:r>
-            <a:rPr lang="en-US" sz="4300" kern="1200"/>
-            <a:t>Decision Tree</a:t>
+            <a:rPr lang="en-US" sz="3800" kern="1200" dirty="0"/>
+            <a:t>Logistic Regression</a:t>
           </a:r>
         </a:p>
         <a:p>
-          <a:pPr marL="285750" lvl="1" indent="-285750" algn="l" defTabSz="1911350">
+          <a:pPr marL="285750" lvl="1" indent="-285750" algn="l" defTabSz="1689100">
             <a:lnSpc>
               <a:spcPct val="90000"/>
             </a:lnSpc>
@@ -18547,12 +19084,12 @@
             <a:buChar char="•"/>
           </a:pPr>
           <a:r>
-            <a:rPr lang="en-US" sz="4300" kern="1200"/>
-            <a:t>Random Forest</a:t>
+            <a:rPr lang="en-US" sz="3800" kern="1200" dirty="0"/>
+            <a:t>Decision Tree</a:t>
           </a:r>
         </a:p>
         <a:p>
-          <a:pPr marL="285750" lvl="1" indent="-285750" algn="l" defTabSz="1911350">
+          <a:pPr marL="285750" lvl="1" indent="-285750" algn="l" defTabSz="1689100">
             <a:lnSpc>
               <a:spcPct val="90000"/>
             </a:lnSpc>
@@ -18565,12 +19102,12 @@
             <a:buChar char="•"/>
           </a:pPr>
           <a:r>
-            <a:rPr lang="en-US" sz="4300" kern="1200"/>
-            <a:t>SVM (RBF)</a:t>
+            <a:rPr lang="en-US" sz="3800" kern="1200"/>
+            <a:t>Random Forest</a:t>
           </a:r>
         </a:p>
         <a:p>
-          <a:pPr marL="285750" lvl="1" indent="-285750" algn="l" defTabSz="1911350">
+          <a:pPr marL="285750" lvl="1" indent="-285750" algn="l" defTabSz="1689100">
             <a:lnSpc>
               <a:spcPct val="90000"/>
             </a:lnSpc>
@@ -18583,14 +19120,32 @@
             <a:buChar char="•"/>
           </a:pPr>
           <a:r>
-            <a:rPr lang="en-US" sz="4300" kern="1200"/>
+            <a:rPr lang="en-US" sz="3800" kern="1200"/>
+            <a:t>SVM (RBF)</a:t>
+          </a:r>
+        </a:p>
+        <a:p>
+          <a:pPr marL="285750" lvl="1" indent="-285750" algn="l" defTabSz="1689100">
+            <a:lnSpc>
+              <a:spcPct val="90000"/>
+            </a:lnSpc>
+            <a:spcBef>
+              <a:spcPct val="0"/>
+            </a:spcBef>
+            <a:spcAft>
+              <a:spcPct val="20000"/>
+            </a:spcAft>
+            <a:buChar char="•"/>
+          </a:pPr>
+          <a:r>
+            <a:rPr lang="en-US" sz="3800" kern="1200"/>
             <a:t>Combines linear &amp; non-linear approaches</a:t>
           </a:r>
         </a:p>
       </dsp:txBody>
       <dsp:txXfrm>
-        <a:off x="0" y="1321393"/>
-        <a:ext cx="6797675" cy="4326300"/>
+        <a:off x="0" y="1181128"/>
+        <a:ext cx="6797675" cy="4462920"/>
       </dsp:txXfrm>
     </dsp:sp>
   </dsp:spTree>
@@ -19694,8 +20249,8 @@
             <a:buNone/>
           </a:pPr>
           <a:r>
-            <a:rPr lang="en-US" sz="2500" kern="1200"/>
-            <a:t>Random Forest performs best</a:t>
+            <a:rPr lang="en-US" sz="2500" kern="1200" dirty="0"/>
+            <a:t>Logistic Regression performs best both before and after Tuning</a:t>
           </a:r>
         </a:p>
       </dsp:txBody>
@@ -19845,8 +20400,8 @@
             <a:buNone/>
           </a:pPr>
           <a:r>
-            <a:rPr lang="en-US" sz="2500" kern="1200"/>
-            <a:t>High recall + strong generalization</a:t>
+            <a:rPr lang="en-US" sz="2500" kern="1200" dirty="0"/>
+            <a:t>Logistic Regression has got High recall + strong generalization both before and after Tuning</a:t>
           </a:r>
         </a:p>
       </dsp:txBody>
@@ -19996,8 +20551,8 @@
             <a:buNone/>
           </a:pPr>
           <a:r>
-            <a:rPr lang="en-US" sz="2500" kern="1200"/>
-            <a:t>Balanced precision–recall</a:t>
+            <a:rPr lang="en-US" sz="2500" kern="1200" dirty="0"/>
+            <a:t>Balanced precision–recall both before and after Tuning</a:t>
           </a:r>
         </a:p>
       </dsp:txBody>
@@ -35959,7 +36514,7 @@
           <a:p>
             <a:fld id="{91D0B005-AE3F-4DA2-9559-980D1360C114}" type="datetimeFigureOut">
               <a:rPr lang="en-SG" smtClean="0"/>
-              <a:t>10/11/25</a:t>
+              <a:t>14/11/2025</a:t>
             </a:fld>
             <a:endParaRPr lang="en-SG"/>
           </a:p>
@@ -36136,7 +36691,7 @@
           <a:p>
             <a:fld id="{AEA0547B-158A-49BE-8714-80B0BEEFC392}" type="datetimeFigureOut">
               <a:rPr lang="en-SG" smtClean="0"/>
-              <a:t>10/11/25</a:t>
+              <a:t>12/11/2025</a:t>
             </a:fld>
             <a:endParaRPr lang="en-SG"/>
           </a:p>
@@ -39977,7 +40532,7 @@
               <a:rPr lang="en-US" sz="2800" i="1" dirty="0">
                 <a:latin typeface="Graphik Regular" panose="020B0503030202060203" pitchFamily="34" charset="0"/>
               </a:rPr>
-              <a:t>Course Project Proposal</a:t>
+              <a:t>Course Project Presentation</a:t>
             </a:r>
             <a:br>
               <a:rPr lang="en-US" sz="2800" i="1" dirty="0">
@@ -40375,7 +40930,13 @@
   <p:cSld>
     <p:spTree>
       <p:nvGrpSpPr>
-        <p:cNvPr id="1" name=""/>
+        <p:cNvPr id="1" name="">
+          <a:extLst>
+            <a:ext uri="{FF2B5EF4-FFF2-40B4-BE49-F238E27FC236}">
+              <a16:creationId xmlns:a16="http://schemas.microsoft.com/office/drawing/2014/main" id="{EEB8A142-F38A-4DBB-08E4-D0CF1D21DCE0}"/>
+            </a:ext>
+          </a:extLst>
+        </p:cNvPr>
         <p:cNvGrpSpPr/>
         <p:nvPr/>
       </p:nvGrpSpPr>
@@ -40389,7 +40950,13 @@
       </p:grpSpPr>
       <p:sp>
         <p:nvSpPr>
-          <p:cNvPr id="2" name="Title 1"/>
+          <p:cNvPr id="2" name="Title 1">
+            <a:extLst>
+              <a:ext uri="{FF2B5EF4-FFF2-40B4-BE49-F238E27FC236}">
+                <a16:creationId xmlns:a16="http://schemas.microsoft.com/office/drawing/2014/main" id="{02855DE5-96DC-9CA6-23FC-C5881CE1F4E1}"/>
+              </a:ext>
+            </a:extLst>
+          </p:cNvPr>
           <p:cNvSpPr>
             <a:spLocks noGrp="1"/>
           </p:cNvSpPr>
@@ -40397,20 +40964,97 @@
             <p:ph type="title"/>
           </p:nvPr>
         </p:nvSpPr>
-        <p:spPr/>
+        <p:spPr>
+          <a:xfrm>
+            <a:off x="671361" y="136140"/>
+            <a:ext cx="5672633" cy="994039"/>
+          </a:xfrm>
+        </p:spPr>
         <p:txBody>
           <a:bodyPr/>
           <a:lstStyle/>
           <a:p>
             <a:r>
-              <a:t>Confusion Matrix – Logistic Regression</a:t>
+              <a:rPr dirty="0"/>
+              <a:t>ROC Curves</a:t>
+            </a:r>
+            <a:r>
+              <a:rPr lang="en-US" dirty="0"/>
+              <a:t> After Tuning</a:t>
+            </a:r>
+            <a:endParaRPr dirty="0"/>
+          </a:p>
+        </p:txBody>
+      </p:sp>
+      <p:sp>
+        <p:nvSpPr>
+          <p:cNvPr id="10" name="Title 1">
+            <a:extLst>
+              <a:ext uri="{FF2B5EF4-FFF2-40B4-BE49-F238E27FC236}">
+                <a16:creationId xmlns:a16="http://schemas.microsoft.com/office/drawing/2014/main" id="{BBF06E2F-747C-CC4F-ADD4-B0E725020A6B}"/>
+              </a:ext>
+            </a:extLst>
+          </p:cNvPr>
+          <p:cNvSpPr txBox="1">
+            <a:spLocks/>
+          </p:cNvSpPr>
+          <p:nvPr/>
+        </p:nvSpPr>
+        <p:spPr>
+          <a:xfrm>
+            <a:off x="6716211" y="342612"/>
+            <a:ext cx="5111995" cy="994039"/>
+          </a:xfrm>
+          <a:prstGeom prst="rect">
+            <a:avLst/>
+          </a:prstGeom>
+        </p:spPr>
+        <p:txBody>
+          <a:bodyPr vert="horz" lIns="91440" tIns="45720" rIns="91440" bIns="45720" rtlCol="0" anchor="b">
+            <a:normAutofit fontScale="92500" lnSpcReduction="10000"/>
+          </a:bodyPr>
+          <a:lstStyle>
+            <a:lvl1pPr algn="l" defTabSz="914400" rtl="0" eaLnBrk="1" latinLnBrk="0" hangingPunct="1">
+              <a:lnSpc>
+                <a:spcPct val="85000"/>
+              </a:lnSpc>
+              <a:spcBef>
+                <a:spcPct val="0"/>
+              </a:spcBef>
+              <a:buNone/>
+              <a:defRPr sz="4000" b="0" kern="1200" spc="-50" baseline="0">
+                <a:solidFill>
+                  <a:schemeClr val="accent2"/>
+                </a:solidFill>
+                <a:latin typeface="Graphik Semibold" panose="020B0703030202060203" pitchFamily="34" charset="0"/>
+                <a:ea typeface="+mj-ea"/>
+                <a:cs typeface="+mj-cs"/>
+              </a:defRPr>
+            </a:lvl1pPr>
+          </a:lstStyle>
+          <a:p>
+            <a:r>
+              <a:rPr lang="en-IN" dirty="0"/>
+              <a:t>Model Performance </a:t>
+            </a:r>
+          </a:p>
+          <a:p>
+            <a:r>
+              <a:rPr lang="en-IN" dirty="0"/>
+              <a:t>After Tuning</a:t>
             </a:r>
           </a:p>
         </p:txBody>
       </p:sp>
       <p:pic>
         <p:nvPicPr>
-          <p:cNvPr id="3" name="Picture 2" descr="roc_curves.png"/>
+          <p:cNvPr id="6" name="Picture 5">
+            <a:extLst>
+              <a:ext uri="{FF2B5EF4-FFF2-40B4-BE49-F238E27FC236}">
+                <a16:creationId xmlns:a16="http://schemas.microsoft.com/office/drawing/2014/main" id="{F9DEC95A-A166-51F8-F5E3-6652BF9C47E5}"/>
+              </a:ext>
+            </a:extLst>
+          </p:cNvPr>
           <p:cNvPicPr>
             <a:picLocks noChangeAspect="1"/>
           </p:cNvPicPr>
@@ -40424,8 +41068,8 @@
         </p:blipFill>
         <p:spPr>
           <a:xfrm>
-            <a:off x="2438400" y="1371600"/>
-            <a:ext cx="7315200" cy="5486400"/>
+            <a:off x="6240758" y="2325672"/>
+            <a:ext cx="5942537" cy="2659285"/>
           </a:xfrm>
           <a:prstGeom prst="rect">
             <a:avLst/>
@@ -40434,10 +41078,10 @@
       </p:pic>
       <p:pic>
         <p:nvPicPr>
-          <p:cNvPr id="5" name="Picture 4" descr="A graph with numbers and a number in blue squares&#10;&#10;AI-generated content may be incorrect.">
+          <p:cNvPr id="4" name="Picture 3">
             <a:extLst>
               <a:ext uri="{FF2B5EF4-FFF2-40B4-BE49-F238E27FC236}">
-                <a16:creationId xmlns:a16="http://schemas.microsoft.com/office/drawing/2014/main" id="{EDC40A31-1A7C-2D09-4D54-F33111364113}"/>
+                <a16:creationId xmlns:a16="http://schemas.microsoft.com/office/drawing/2014/main" id="{9410551C-CB71-E5FE-56E1-6072F6B6EAB0}"/>
               </a:ext>
             </a:extLst>
           </p:cNvPr>
@@ -40460,8 +41104,8 @@
         </p:blipFill>
         <p:spPr>
           <a:xfrm>
-            <a:off x="3810000" y="1600200"/>
-            <a:ext cx="4572000" cy="3657600"/>
+            <a:off x="4925" y="1201974"/>
+            <a:ext cx="6400813" cy="5486411"/>
           </a:xfrm>
           <a:prstGeom prst="rect">
             <a:avLst/>
@@ -40469,6 +41113,11 @@
         </p:spPr>
       </p:pic>
     </p:spTree>
+    <p:extLst>
+      <p:ext uri="{BB962C8B-B14F-4D97-AF65-F5344CB8AC3E}">
+        <p14:creationId xmlns:p14="http://schemas.microsoft.com/office/powerpoint/2010/main" val="3187937395"/>
+      </p:ext>
+    </p:extLst>
   </p:cSld>
   <p:clrMapOvr>
     <a:masterClrMapping/>
@@ -40477,324 +41126,6 @@
 </file>
 
 <file path=ppt/slides/slide11.xml><?xml version="1.0" encoding="utf-8"?>
-<p:sld xmlns:a="http://schemas.openxmlformats.org/drawingml/2006/main" xmlns:r="http://schemas.openxmlformats.org/officeDocument/2006/relationships" xmlns:p="http://schemas.openxmlformats.org/presentationml/2006/main">
-  <p:cSld>
-    <p:spTree>
-      <p:nvGrpSpPr>
-        <p:cNvPr id="1" name=""/>
-        <p:cNvGrpSpPr/>
-        <p:nvPr/>
-      </p:nvGrpSpPr>
-      <p:grpSpPr>
-        <a:xfrm>
-          <a:off x="0" y="0"/>
-          <a:ext cx="0" cy="0"/>
-          <a:chOff x="0" y="0"/>
-          <a:chExt cx="0" cy="0"/>
-        </a:xfrm>
-      </p:grpSpPr>
-      <p:sp>
-        <p:nvSpPr>
-          <p:cNvPr id="2" name="Title 1"/>
-          <p:cNvSpPr>
-            <a:spLocks noGrp="1"/>
-          </p:cNvSpPr>
-          <p:nvPr>
-            <p:ph type="title"/>
-          </p:nvPr>
-        </p:nvSpPr>
-        <p:spPr/>
-        <p:txBody>
-          <a:bodyPr/>
-          <a:lstStyle/>
-          <a:p>
-            <a:r>
-              <a:t>Confusion Matrix – Decision Tree</a:t>
-            </a:r>
-          </a:p>
-        </p:txBody>
-      </p:sp>
-      <p:pic>
-        <p:nvPicPr>
-          <p:cNvPr id="3" name="Picture 2" descr="roc_curves.png"/>
-          <p:cNvPicPr>
-            <a:picLocks noChangeAspect="1"/>
-          </p:cNvPicPr>
-          <p:nvPr/>
-        </p:nvPicPr>
-        <p:blipFill>
-          <a:blip r:embed="rId2"/>
-          <a:stretch>
-            <a:fillRect/>
-          </a:stretch>
-        </p:blipFill>
-        <p:spPr>
-          <a:xfrm>
-            <a:off x="2438400" y="1371600"/>
-            <a:ext cx="7315200" cy="5486400"/>
-          </a:xfrm>
-          <a:prstGeom prst="rect">
-            <a:avLst/>
-          </a:prstGeom>
-        </p:spPr>
-      </p:pic>
-      <p:pic>
-        <p:nvPicPr>
-          <p:cNvPr id="5" name="Picture 4" descr="A blue squares with numbers and lines&#10;&#10;AI-generated content may be incorrect.">
-            <a:extLst>
-              <a:ext uri="{FF2B5EF4-FFF2-40B4-BE49-F238E27FC236}">
-                <a16:creationId xmlns:a16="http://schemas.microsoft.com/office/drawing/2014/main" id="{C75C759F-AE79-9778-3681-32A3CA70620E}"/>
-              </a:ext>
-            </a:extLst>
-          </p:cNvPr>
-          <p:cNvPicPr>
-            <a:picLocks noChangeAspect="1"/>
-          </p:cNvPicPr>
-          <p:nvPr/>
-        </p:nvPicPr>
-        <p:blipFill>
-          <a:blip r:embed="rId3">
-            <a:extLst>
-              <a:ext uri="{28A0092B-C50C-407E-A947-70E740481C1C}">
-                <a14:useLocalDpi xmlns:a14="http://schemas.microsoft.com/office/drawing/2010/main" val="0"/>
-              </a:ext>
-            </a:extLst>
-          </a:blip>
-          <a:stretch>
-            <a:fillRect/>
-          </a:stretch>
-        </p:blipFill>
-        <p:spPr>
-          <a:xfrm>
-            <a:off x="3810000" y="1600200"/>
-            <a:ext cx="4572000" cy="3657600"/>
-          </a:xfrm>
-          <a:prstGeom prst="rect">
-            <a:avLst/>
-          </a:prstGeom>
-        </p:spPr>
-      </p:pic>
-    </p:spTree>
-  </p:cSld>
-  <p:clrMapOvr>
-    <a:masterClrMapping/>
-  </p:clrMapOvr>
-</p:sld>
-</file>
-
-<file path=ppt/slides/slide12.xml><?xml version="1.0" encoding="utf-8"?>
-<p:sld xmlns:a="http://schemas.openxmlformats.org/drawingml/2006/main" xmlns:r="http://schemas.openxmlformats.org/officeDocument/2006/relationships" xmlns:p="http://schemas.openxmlformats.org/presentationml/2006/main">
-  <p:cSld>
-    <p:spTree>
-      <p:nvGrpSpPr>
-        <p:cNvPr id="1" name=""/>
-        <p:cNvGrpSpPr/>
-        <p:nvPr/>
-      </p:nvGrpSpPr>
-      <p:grpSpPr>
-        <a:xfrm>
-          <a:off x="0" y="0"/>
-          <a:ext cx="0" cy="0"/>
-          <a:chOff x="0" y="0"/>
-          <a:chExt cx="0" cy="0"/>
-        </a:xfrm>
-      </p:grpSpPr>
-      <p:sp>
-        <p:nvSpPr>
-          <p:cNvPr id="2" name="Title 1"/>
-          <p:cNvSpPr>
-            <a:spLocks noGrp="1"/>
-          </p:cNvSpPr>
-          <p:nvPr>
-            <p:ph type="title"/>
-          </p:nvPr>
-        </p:nvSpPr>
-        <p:spPr/>
-        <p:txBody>
-          <a:bodyPr/>
-          <a:lstStyle/>
-          <a:p>
-            <a:r>
-              <a:t>Confusion Matrix – Random Forest</a:t>
-            </a:r>
-          </a:p>
-        </p:txBody>
-      </p:sp>
-      <p:pic>
-        <p:nvPicPr>
-          <p:cNvPr id="3" name="Picture 2" descr="roc_curves.png"/>
-          <p:cNvPicPr>
-            <a:picLocks noChangeAspect="1"/>
-          </p:cNvPicPr>
-          <p:nvPr/>
-        </p:nvPicPr>
-        <p:blipFill>
-          <a:blip r:embed="rId2"/>
-          <a:stretch>
-            <a:fillRect/>
-          </a:stretch>
-        </p:blipFill>
-        <p:spPr>
-          <a:xfrm>
-            <a:off x="2438400" y="1371600"/>
-            <a:ext cx="7315200" cy="5486400"/>
-          </a:xfrm>
-          <a:prstGeom prst="rect">
-            <a:avLst/>
-          </a:prstGeom>
-        </p:spPr>
-      </p:pic>
-      <p:pic>
-        <p:nvPicPr>
-          <p:cNvPr id="5" name="Picture 4" descr="A graph of a graph with numbers and a number&#10;&#10;AI-generated content may be incorrect.">
-            <a:extLst>
-              <a:ext uri="{FF2B5EF4-FFF2-40B4-BE49-F238E27FC236}">
-                <a16:creationId xmlns:a16="http://schemas.microsoft.com/office/drawing/2014/main" id="{9F1712D3-C67D-D8D1-427B-C74EE6E2BE9A}"/>
-              </a:ext>
-            </a:extLst>
-          </p:cNvPr>
-          <p:cNvPicPr>
-            <a:picLocks noChangeAspect="1"/>
-          </p:cNvPicPr>
-          <p:nvPr/>
-        </p:nvPicPr>
-        <p:blipFill>
-          <a:blip r:embed="rId3">
-            <a:extLst>
-              <a:ext uri="{28A0092B-C50C-407E-A947-70E740481C1C}">
-                <a14:useLocalDpi xmlns:a14="http://schemas.microsoft.com/office/drawing/2010/main" val="0"/>
-              </a:ext>
-            </a:extLst>
-          </a:blip>
-          <a:stretch>
-            <a:fillRect/>
-          </a:stretch>
-        </p:blipFill>
-        <p:spPr>
-          <a:xfrm>
-            <a:off x="3810000" y="1600200"/>
-            <a:ext cx="4572000" cy="3657600"/>
-          </a:xfrm>
-          <a:prstGeom prst="rect">
-            <a:avLst/>
-          </a:prstGeom>
-        </p:spPr>
-      </p:pic>
-    </p:spTree>
-  </p:cSld>
-  <p:clrMapOvr>
-    <a:masterClrMapping/>
-  </p:clrMapOvr>
-</p:sld>
-</file>
-
-<file path=ppt/slides/slide13.xml><?xml version="1.0" encoding="utf-8"?>
-<p:sld xmlns:a="http://schemas.openxmlformats.org/drawingml/2006/main" xmlns:r="http://schemas.openxmlformats.org/officeDocument/2006/relationships" xmlns:p="http://schemas.openxmlformats.org/presentationml/2006/main">
-  <p:cSld>
-    <p:spTree>
-      <p:nvGrpSpPr>
-        <p:cNvPr id="1" name=""/>
-        <p:cNvGrpSpPr/>
-        <p:nvPr/>
-      </p:nvGrpSpPr>
-      <p:grpSpPr>
-        <a:xfrm>
-          <a:off x="0" y="0"/>
-          <a:ext cx="0" cy="0"/>
-          <a:chOff x="0" y="0"/>
-          <a:chExt cx="0" cy="0"/>
-        </a:xfrm>
-      </p:grpSpPr>
-      <p:sp>
-        <p:nvSpPr>
-          <p:cNvPr id="2" name="Title 1"/>
-          <p:cNvSpPr>
-            <a:spLocks noGrp="1"/>
-          </p:cNvSpPr>
-          <p:nvPr>
-            <p:ph type="title"/>
-          </p:nvPr>
-        </p:nvSpPr>
-        <p:spPr/>
-        <p:txBody>
-          <a:bodyPr/>
-          <a:lstStyle/>
-          <a:p>
-            <a:r>
-              <a:t>Confusion Matrix – SVM (RBF)</a:t>
-            </a:r>
-          </a:p>
-        </p:txBody>
-      </p:sp>
-      <p:pic>
-        <p:nvPicPr>
-          <p:cNvPr id="3" name="Picture 2" descr="roc_curves.png"/>
-          <p:cNvPicPr>
-            <a:picLocks noChangeAspect="1"/>
-          </p:cNvPicPr>
-          <p:nvPr/>
-        </p:nvPicPr>
-        <p:blipFill>
-          <a:blip r:embed="rId2"/>
-          <a:stretch>
-            <a:fillRect/>
-          </a:stretch>
-        </p:blipFill>
-        <p:spPr>
-          <a:xfrm>
-            <a:off x="2438400" y="1371600"/>
-            <a:ext cx="7315200" cy="5486400"/>
-          </a:xfrm>
-          <a:prstGeom prst="rect">
-            <a:avLst/>
-          </a:prstGeom>
-        </p:spPr>
-      </p:pic>
-      <p:pic>
-        <p:nvPicPr>
-          <p:cNvPr id="5" name="Picture 4" descr="A graph of confusion matrix&#10;&#10;AI-generated content may be incorrect.">
-            <a:extLst>
-              <a:ext uri="{FF2B5EF4-FFF2-40B4-BE49-F238E27FC236}">
-                <a16:creationId xmlns:a16="http://schemas.microsoft.com/office/drawing/2014/main" id="{491B7E26-4886-958B-F115-B040951E7FFE}"/>
-              </a:ext>
-            </a:extLst>
-          </p:cNvPr>
-          <p:cNvPicPr>
-            <a:picLocks noChangeAspect="1"/>
-          </p:cNvPicPr>
-          <p:nvPr/>
-        </p:nvPicPr>
-        <p:blipFill>
-          <a:blip r:embed="rId3">
-            <a:extLst>
-              <a:ext uri="{28A0092B-C50C-407E-A947-70E740481C1C}">
-                <a14:useLocalDpi xmlns:a14="http://schemas.microsoft.com/office/drawing/2010/main" val="0"/>
-              </a:ext>
-            </a:extLst>
-          </a:blip>
-          <a:stretch>
-            <a:fillRect/>
-          </a:stretch>
-        </p:blipFill>
-        <p:spPr>
-          <a:xfrm>
-            <a:off x="3810000" y="1600200"/>
-            <a:ext cx="4572000" cy="3657600"/>
-          </a:xfrm>
-          <a:prstGeom prst="rect">
-            <a:avLst/>
-          </a:prstGeom>
-        </p:spPr>
-      </p:pic>
-    </p:spTree>
-  </p:cSld>
-  <p:clrMapOvr>
-    <a:masterClrMapping/>
-  </p:clrMapOvr>
-</p:sld>
-</file>
-
-<file path=ppt/slides/slide14.xml><?xml version="1.0" encoding="utf-8"?>
 <p:sld xmlns:a="http://schemas.openxmlformats.org/drawingml/2006/main" xmlns:r="http://schemas.openxmlformats.org/officeDocument/2006/relationships" xmlns:p="http://schemas.openxmlformats.org/presentationml/2006/main">
   <p:cSld>
     <p:bg>
@@ -41052,7 +41383,7 @@
             <p:ph idx="1"/>
             <p:extLst>
               <p:ext uri="{D42A27DB-BD31-4B8C-83A1-F6EECF244321}">
-                <p14:modId xmlns:p14="http://schemas.microsoft.com/office/powerpoint/2010/main" val="3871502591"/>
+                <p14:modId xmlns:p14="http://schemas.microsoft.com/office/powerpoint/2010/main" val="2691148958"/>
               </p:ext>
             </p:extLst>
           </p:nvPr>
@@ -41075,7 +41406,7 @@
 </p:sld>
 </file>
 
-<file path=ppt/slides/slide15.xml><?xml version="1.0" encoding="utf-8"?>
+<file path=ppt/slides/slide12.xml><?xml version="1.0" encoding="utf-8"?>
 <p:sld xmlns:a="http://schemas.openxmlformats.org/drawingml/2006/main" xmlns:r="http://schemas.openxmlformats.org/officeDocument/2006/relationships" xmlns:p="http://schemas.openxmlformats.org/presentationml/2006/main">
   <p:cSld>
     <p:bg>
@@ -41356,7 +41687,7 @@
 </p:sld>
 </file>
 
-<file path=ppt/slides/slide16.xml><?xml version="1.0" encoding="utf-8"?>
+<file path=ppt/slides/slide13.xml><?xml version="1.0" encoding="utf-8"?>
 <p:sld xmlns:a="http://schemas.openxmlformats.org/drawingml/2006/main" xmlns:r="http://schemas.openxmlformats.org/officeDocument/2006/relationships" xmlns:p="http://schemas.openxmlformats.org/presentationml/2006/main">
   <p:cSld>
     <p:bg>
@@ -41614,7 +41945,7 @@
             <p:ph idx="1"/>
             <p:extLst>
               <p:ext uri="{D42A27DB-BD31-4B8C-83A1-F6EECF244321}">
-                <p14:modId xmlns:p14="http://schemas.microsoft.com/office/powerpoint/2010/main" val="1167704207"/>
+                <p14:modId xmlns:p14="http://schemas.microsoft.com/office/powerpoint/2010/main" val="1586483070"/>
               </p:ext>
             </p:extLst>
           </p:nvPr>
@@ -41637,7 +41968,7 @@
 </p:sld>
 </file>
 
-<file path=ppt/slides/slide17.xml><?xml version="1.0" encoding="utf-8"?>
+<file path=ppt/slides/slide14.xml><?xml version="1.0" encoding="utf-8"?>
 <p:sld xmlns:a="http://schemas.openxmlformats.org/drawingml/2006/main" xmlns:r="http://schemas.openxmlformats.org/officeDocument/2006/relationships" xmlns:p="http://schemas.openxmlformats.org/presentationml/2006/main">
   <p:cSld>
     <p:bg>
@@ -41918,7 +42249,7 @@
 </p:sld>
 </file>
 
-<file path=ppt/slides/slide18.xml><?xml version="1.0" encoding="utf-8"?>
+<file path=ppt/slides/slide15.xml><?xml version="1.0" encoding="utf-8"?>
 <p:sld xmlns:a="http://schemas.openxmlformats.org/drawingml/2006/main" xmlns:r="http://schemas.openxmlformats.org/officeDocument/2006/relationships" xmlns:p="http://schemas.openxmlformats.org/presentationml/2006/main">
   <p:cSld>
     <p:spTree>
@@ -41970,6 +42301,11 @@
           </p:cNvGraphicFramePr>
           <p:nvPr>
             <p:ph idx="1"/>
+            <p:extLst>
+              <p:ext uri="{D42A27DB-BD31-4B8C-83A1-F6EECF244321}">
+                <p14:modId xmlns:p14="http://schemas.microsoft.com/office/powerpoint/2010/main" val="1015087818"/>
+              </p:ext>
+            </p:extLst>
           </p:nvPr>
         </p:nvGraphicFramePr>
         <p:xfrm>
@@ -41990,7 +42326,7 @@
 </p:sld>
 </file>
 
-<file path=ppt/slides/slide19.xml><?xml version="1.0" encoding="utf-8"?>
+<file path=ppt/slides/slide16.xml><?xml version="1.0" encoding="utf-8"?>
 <p:sld xmlns:a="http://schemas.openxmlformats.org/drawingml/2006/main" xmlns:r="http://schemas.openxmlformats.org/officeDocument/2006/relationships" xmlns:p="http://schemas.openxmlformats.org/presentationml/2006/main">
   <p:cSld>
     <p:bg>
@@ -42283,7 +42619,7 @@
           <a:lstStyle/>
           <a:p>
             <a:r>
-              <a:rPr lang="en-US" sz="8000">
+              <a:rPr lang="en-US" sz="8000" dirty="0">
                 <a:solidFill>
                   <a:schemeClr val="tx1">
                     <a:lumMod val="85000"/>
@@ -42295,7 +42631,7 @@
               <a:t>Thank you!</a:t>
             </a:r>
             <a:br>
-              <a:rPr lang="en-US" sz="8000">
+              <a:rPr lang="en-US" sz="8000" dirty="0">
                 <a:solidFill>
                   <a:schemeClr val="tx1">
                     <a:lumMod val="85000"/>
@@ -42305,7 +42641,7 @@
                 <a:latin typeface="+mj-lt"/>
               </a:rPr>
             </a:br>
-            <a:endParaRPr lang="en-US" sz="8000">
+            <a:endParaRPr lang="en-US" sz="8000" dirty="0">
               <a:solidFill>
                 <a:schemeClr val="tx1">
                   <a:lumMod val="85000"/>
@@ -42475,7 +42811,7 @@
               </a:spcAft>
             </a:pPr>
             <a:r>
-              <a:rPr lang="en-US" sz="900" kern="1200" cap="all" baseline="0">
+              <a:rPr lang="en-US" sz="900" kern="1200" cap="all" baseline="0" dirty="0">
                 <a:solidFill>
                   <a:srgbClr val="FFFFFF"/>
                 </a:solidFill>
@@ -42483,7 +42819,7 @@
                 <a:ea typeface="+mn-ea"/>
                 <a:cs typeface="+mn-cs"/>
               </a:rPr>
-              <a:t>DA 204o: Data Science in Practice</a:t>
+              <a:t>DA 227o: Data MINING</a:t>
             </a:r>
           </a:p>
         </p:txBody>
@@ -42533,7 +42869,7 @@
                   <a:spcPts val="600"/>
                 </a:spcAft>
               </a:pPr>
-              <a:t>19</a:t>
+              <a:t>16</a:t>
             </a:fld>
             <a:endParaRPr lang="en-US">
               <a:solidFill>
@@ -42819,13 +43155,37 @@
           <a:lstStyle/>
           <a:p>
             <a:r>
-              <a:rPr lang="en-IN" sz="3600">
+              <a:rPr lang="en-IN" sz="3600" dirty="0">
                 <a:solidFill>
                   <a:srgbClr val="FFFFFF"/>
                 </a:solidFill>
               </a:rPr>
-              <a:t>Problem Statement</a:t>
+              <a:t>Problem Statement: </a:t>
             </a:r>
+            <a:br>
+              <a:rPr lang="en-IN" dirty="0"/>
+            </a:br>
+            <a:r>
+              <a:rPr lang="en-US" b="1" dirty="0">
+                <a:solidFill>
+                  <a:srgbClr val="002060"/>
+                </a:solidFill>
+              </a:rPr>
+              <a:t>Customer Churn Prediction using Machine Learning</a:t>
+            </a:r>
+            <a:r>
+              <a:rPr lang="en-US" dirty="0">
+                <a:solidFill>
+                  <a:srgbClr val="002060"/>
+                </a:solidFill>
+              </a:rPr>
+              <a:t> </a:t>
+            </a:r>
+            <a:endParaRPr lang="en-IN" sz="3600" dirty="0">
+              <a:solidFill>
+                <a:srgbClr val="002060"/>
+              </a:solidFill>
+            </a:endParaRPr>
           </a:p>
         </p:txBody>
       </p:sp>
@@ -43188,14 +43548,14 @@
             <p:ph idx="1"/>
             <p:extLst>
               <p:ext uri="{D42A27DB-BD31-4B8C-83A1-F6EECF244321}">
-                <p14:modId xmlns:p14="http://schemas.microsoft.com/office/powerpoint/2010/main" val="3190922342"/>
+                <p14:modId xmlns:p14="http://schemas.microsoft.com/office/powerpoint/2010/main" val="627364549"/>
               </p:ext>
             </p:extLst>
           </p:nvPr>
         </p:nvGraphicFramePr>
         <p:xfrm>
-          <a:off x="4741863" y="639763"/>
-          <a:ext cx="6797675" cy="5649912"/>
+          <a:off x="4505887" y="324465"/>
+          <a:ext cx="7051832" cy="5965210"/>
         </p:xfrm>
         <a:graphic>
           <a:graphicData uri="http://schemas.openxmlformats.org/drawingml/2006/diagram">
@@ -44462,7 +44822,7 @@
             <p:ph idx="1"/>
             <p:extLst>
               <p:ext uri="{D42A27DB-BD31-4B8C-83A1-F6EECF244321}">
-                <p14:modId xmlns:p14="http://schemas.microsoft.com/office/powerpoint/2010/main" val="262290886"/>
+                <p14:modId xmlns:p14="http://schemas.microsoft.com/office/powerpoint/2010/main" val="3400692353"/>
               </p:ext>
             </p:extLst>
           </p:nvPr>
@@ -44584,20 +44944,37 @@
             <p:ph type="title"/>
           </p:nvPr>
         </p:nvSpPr>
-        <p:spPr/>
+        <p:spPr>
+          <a:xfrm>
+            <a:off x="568125" y="47652"/>
+            <a:ext cx="5483631" cy="994039"/>
+          </a:xfrm>
+        </p:spPr>
         <p:txBody>
           <a:bodyPr/>
           <a:lstStyle/>
           <a:p>
             <a:r>
+              <a:rPr dirty="0"/>
               <a:t>ROC Curves</a:t>
             </a:r>
+            <a:r>
+              <a:rPr lang="en-US" dirty="0"/>
+              <a:t> Before Tuning</a:t>
+            </a:r>
+            <a:endParaRPr dirty="0"/>
           </a:p>
         </p:txBody>
       </p:sp>
       <p:pic>
         <p:nvPicPr>
-          <p:cNvPr id="3" name="Picture 2" descr="roc_curves.png"/>
+          <p:cNvPr id="9" name="Picture 8">
+            <a:extLst>
+              <a:ext uri="{FF2B5EF4-FFF2-40B4-BE49-F238E27FC236}">
+                <a16:creationId xmlns:a16="http://schemas.microsoft.com/office/drawing/2014/main" id="{4D94D8B4-0BB6-05F2-2998-0A3334AFFE54}"/>
+              </a:ext>
+            </a:extLst>
+          </p:cNvPr>
           <p:cNvPicPr>
             <a:picLocks noChangeAspect="1"/>
           </p:cNvPicPr>
@@ -44611,8 +44988,8 @@
         </p:blipFill>
         <p:spPr>
           <a:xfrm>
-            <a:off x="2438400" y="1371600"/>
-            <a:ext cx="7315200" cy="5486400"/>
+            <a:off x="6169740" y="2384664"/>
+            <a:ext cx="6092018" cy="2615039"/>
           </a:xfrm>
           <a:prstGeom prst="rect">
             <a:avLst/>
@@ -44621,10 +44998,10 @@
       </p:pic>
       <p:pic>
         <p:nvPicPr>
-          <p:cNvPr id="5" name="Picture 4" descr="A graph of a curve&#10;&#10;AI-generated content may be incorrect.">
+          <p:cNvPr id="7" name="Picture 6">
             <a:extLst>
               <a:ext uri="{FF2B5EF4-FFF2-40B4-BE49-F238E27FC236}">
-                <a16:creationId xmlns:a16="http://schemas.microsoft.com/office/drawing/2014/main" id="{01579514-FB74-A75A-1ABA-946C619A35CE}"/>
+                <a16:creationId xmlns:a16="http://schemas.microsoft.com/office/drawing/2014/main" id="{7331F649-97F3-5A86-83AF-A899FBE7D6D0}"/>
               </a:ext>
             </a:extLst>
           </p:cNvPr>
@@ -44647,14 +45024,68 @@
         </p:blipFill>
         <p:spPr>
           <a:xfrm>
-            <a:off x="2946400" y="742950"/>
-            <a:ext cx="6299200" cy="5372100"/>
+            <a:off x="4910" y="1157730"/>
+            <a:ext cx="6400813" cy="5486411"/>
           </a:xfrm>
           <a:prstGeom prst="rect">
             <a:avLst/>
           </a:prstGeom>
         </p:spPr>
       </p:pic>
+      <p:sp>
+        <p:nvSpPr>
+          <p:cNvPr id="10" name="Title 1">
+            <a:extLst>
+              <a:ext uri="{FF2B5EF4-FFF2-40B4-BE49-F238E27FC236}">
+                <a16:creationId xmlns:a16="http://schemas.microsoft.com/office/drawing/2014/main" id="{5B163B04-E38B-490C-D4FD-9D8858335750}"/>
+              </a:ext>
+            </a:extLst>
+          </p:cNvPr>
+          <p:cNvSpPr txBox="1">
+            <a:spLocks/>
+          </p:cNvSpPr>
+          <p:nvPr/>
+        </p:nvSpPr>
+        <p:spPr>
+          <a:xfrm>
+            <a:off x="6716211" y="342612"/>
+            <a:ext cx="5111995" cy="994039"/>
+          </a:xfrm>
+          <a:prstGeom prst="rect">
+            <a:avLst/>
+          </a:prstGeom>
+        </p:spPr>
+        <p:txBody>
+          <a:bodyPr vert="horz" lIns="91440" tIns="45720" rIns="91440" bIns="45720" rtlCol="0" anchor="b">
+            <a:normAutofit fontScale="92500" lnSpcReduction="10000"/>
+          </a:bodyPr>
+          <a:lstStyle>
+            <a:lvl1pPr algn="l" defTabSz="914400" rtl="0" eaLnBrk="1" latinLnBrk="0" hangingPunct="1">
+              <a:lnSpc>
+                <a:spcPct val="85000"/>
+              </a:lnSpc>
+              <a:spcBef>
+                <a:spcPct val="0"/>
+              </a:spcBef>
+              <a:buNone/>
+              <a:defRPr sz="4000" b="0" kern="1200" spc="-50" baseline="0">
+                <a:solidFill>
+                  <a:schemeClr val="accent2"/>
+                </a:solidFill>
+                <a:latin typeface="Graphik Semibold" panose="020B0703030202060203" pitchFamily="34" charset="0"/>
+                <a:ea typeface="+mj-ea"/>
+                <a:cs typeface="+mj-cs"/>
+              </a:defRPr>
+            </a:lvl1pPr>
+          </a:lstStyle>
+          <a:p>
+            <a:r>
+              <a:rPr lang="en-IN" dirty="0"/>
+              <a:t>Model Performance Before Tuning</a:t>
+            </a:r>
+          </a:p>
+        </p:txBody>
+      </p:sp>
     </p:spTree>
   </p:cSld>
   <p:clrMapOvr>
@@ -45537,6 +45968,15 @@
 </file>
 
 <file path=customXml/item1.xml><?xml version="1.0" encoding="utf-8"?>
+<?mso-contentType ?>
+<FormTemplates xmlns="http://schemas.microsoft.com/sharepoint/v3/contenttype/forms">
+  <Display>DocumentLibraryForm</Display>
+  <Edit>DocumentLibraryForm</Edit>
+  <New>DocumentLibraryForm</New>
+</FormTemplates>
+</file>
+
+<file path=customXml/item2.xml><?xml version="1.0" encoding="utf-8"?>
 <ct:contentTypeSchema xmlns:ct="http://schemas.microsoft.com/office/2006/metadata/contentType" xmlns:ma="http://schemas.microsoft.com/office/2006/metadata/properties/metaAttributes" ct:_="" ma:_="" ma:contentTypeName="Document" ma:contentTypeID="0x0101003B83135591EE7B4E9CE8953A9769B5AA" ma:contentTypeVersion="12" ma:contentTypeDescription="Create a new document." ma:contentTypeScope="" ma:versionID="afb94ed0df6a5bee95e9e8580897838e">
   <xsd:schema xmlns:xsd="http://www.w3.org/2001/XMLSchema" xmlns:xs="http://www.w3.org/2001/XMLSchema" xmlns:p="http://schemas.microsoft.com/office/2006/metadata/properties" xmlns:ns2="b7c451f6-4087-4943-817c-671de9753aab" xmlns:ns3="74614dcc-efbe-4eda-b10f-2861d891d30c" targetNamespace="http://schemas.microsoft.com/office/2006/metadata/properties" ma:root="true" ma:fieldsID="4255e306cc058a65fd4c867a9bd11979" ns2:_="" ns3:_="">
     <xsd:import namespace="b7c451f6-4087-4943-817c-671de9753aab"/>
@@ -45737,16 +46177,15 @@
 </ct:contentTypeSchema>
 </file>
 
-<file path=customXml/item2.xml><?xml version="1.0" encoding="utf-8"?>
-<?mso-contentType ?>
-<FormTemplates xmlns="http://schemas.microsoft.com/sharepoint/v3/contenttype/forms">
-  <Display>DocumentLibraryForm</Display>
-  <Edit>DocumentLibraryForm</Edit>
-  <New>DocumentLibraryForm</New>
-</FormTemplates>
+<file path=customXml/itemProps1.xml><?xml version="1.0" encoding="utf-8"?>
+<ds:datastoreItem xmlns:ds="http://schemas.openxmlformats.org/officeDocument/2006/customXml" ds:itemID="{1F114682-BC25-4105-89B6-5A10279B5AF2}">
+  <ds:schemaRefs>
+    <ds:schemaRef ds:uri="http://schemas.microsoft.com/sharepoint/v3/contenttype/forms"/>
+  </ds:schemaRefs>
+</ds:datastoreItem>
 </file>
 
-<file path=customXml/itemProps1.xml><?xml version="1.0" encoding="utf-8"?>
+<file path=customXml/itemProps2.xml><?xml version="1.0" encoding="utf-8"?>
 <ds:datastoreItem xmlns:ds="http://schemas.openxmlformats.org/officeDocument/2006/customXml" ds:itemID="{3EFFC100-CD6E-40CC-858F-9DDB4630395F}">
   <ds:schemaRefs>
     <ds:schemaRef ds:uri="74614dcc-efbe-4eda-b10f-2861d891d30c"/>
@@ -45763,12 +46202,4 @@
     <ds:schemaRef ds:uri="http://www.w3.org/2001/XMLSchema"/>
   </ds:schemaRefs>
 </ds:datastoreItem>
-</file>
-
-<file path=customXml/itemProps2.xml><?xml version="1.0" encoding="utf-8"?>
-<ds:datastoreItem xmlns:ds="http://schemas.openxmlformats.org/officeDocument/2006/customXml" ds:itemID="{1F114682-BC25-4105-89B6-5A10279B5AF2}">
-  <ds:schemaRefs>
-    <ds:schemaRef ds:uri="http://schemas.microsoft.com/sharepoint/v3/contenttype/forms"/>
-  </ds:schemaRefs>
-</ds:datastoreItem>
 </file>
</xml_diff>